<commit_message>
Mini Project (hospital-management-system) By Darsh Jotangia made changes to the presentation as per Sir's feedback
</commit_message>
<xml_diff>
--- a/MiniProject/hospital-management-system/Hospital Management System By Darsh Jotangia.pptx
+++ b/MiniProject/hospital-management-system/Hospital Management System By Darsh Jotangia.pptx
@@ -21,9 +21,13 @@
     <p:sldId id="264" r:id="rId15"/>
     <p:sldId id="263" r:id="rId16"/>
     <p:sldId id="265" r:id="rId17"/>
-    <p:sldId id="273" r:id="rId18"/>
-    <p:sldId id="274" r:id="rId19"/>
-    <p:sldId id="272" r:id="rId20"/>
+    <p:sldId id="275" r:id="rId18"/>
+    <p:sldId id="278" r:id="rId19"/>
+    <p:sldId id="273" r:id="rId20"/>
+    <p:sldId id="274" r:id="rId21"/>
+    <p:sldId id="276" r:id="rId22"/>
+    <p:sldId id="277" r:id="rId23"/>
+    <p:sldId id="272" r:id="rId24"/>
   </p:sldIdLst>
   <p:sldSz cx="9144000" cy="6858000" type="screen4x3"/>
   <p:notesSz cx="6858000" cy="9144000"/>
@@ -8512,6 +8516,172 @@
           <a:p>
             <a:r>
               <a:rPr lang="en-IN" dirty="0" smtClean="0"/>
+              <a:t>Swagger Screenshot</a:t>
+            </a:r>
+            <a:endParaRPr lang="en-US" dirty="0"/>
+          </a:p>
+        </p:txBody>
+      </p:sp>
+      <p:pic>
+        <p:nvPicPr>
+          <p:cNvPr id="1026" name="Picture 2"/>
+          <p:cNvPicPr>
+            <a:picLocks noGrp="1" noChangeAspect="1" noChangeArrowheads="1"/>
+          </p:cNvPicPr>
+          <p:nvPr>
+            <p:ph idx="1"/>
+          </p:nvPr>
+        </p:nvPicPr>
+        <p:blipFill>
+          <a:blip r:embed="rId2"/>
+          <a:srcRect/>
+          <a:stretch>
+            <a:fillRect/>
+          </a:stretch>
+        </p:blipFill>
+        <p:spPr bwMode="auto">
+          <a:xfrm>
+            <a:off x="458014" y="1774825"/>
+            <a:ext cx="8227971" cy="4625975"/>
+          </a:xfrm>
+          <a:prstGeom prst="rect">
+            <a:avLst/>
+          </a:prstGeom>
+          <a:noFill/>
+          <a:ln w="9525">
+            <a:noFill/>
+            <a:miter lim="800000"/>
+            <a:headEnd/>
+            <a:tailEnd/>
+          </a:ln>
+          <a:effectLst/>
+        </p:spPr>
+      </p:pic>
+    </p:spTree>
+  </p:cSld>
+  <p:clrMapOvr>
+    <a:masterClrMapping/>
+  </p:clrMapOvr>
+</p:sld>
+</file>
+
+<file path=ppt/slides/slide18.xml><?xml version="1.0" encoding="utf-8"?>
+<p:sld xmlns:a="http://schemas.openxmlformats.org/drawingml/2006/main" xmlns:r="http://schemas.openxmlformats.org/officeDocument/2006/relationships" xmlns:p="http://schemas.openxmlformats.org/presentationml/2006/main">
+  <p:cSld>
+    <p:spTree>
+      <p:nvGrpSpPr>
+        <p:cNvPr id="1" name=""/>
+        <p:cNvGrpSpPr/>
+        <p:nvPr/>
+      </p:nvGrpSpPr>
+      <p:grpSpPr>
+        <a:xfrm>
+          <a:off x="0" y="0"/>
+          <a:ext cx="0" cy="0"/>
+          <a:chOff x="0" y="0"/>
+          <a:chExt cx="0" cy="0"/>
+        </a:xfrm>
+      </p:grpSpPr>
+      <p:sp>
+        <p:nvSpPr>
+          <p:cNvPr id="2" name="Title 1"/>
+          <p:cNvSpPr>
+            <a:spLocks noGrp="1"/>
+          </p:cNvSpPr>
+          <p:nvPr>
+            <p:ph type="title"/>
+          </p:nvPr>
+        </p:nvSpPr>
+        <p:spPr/>
+        <p:txBody>
+          <a:bodyPr/>
+          <a:lstStyle/>
+          <a:p>
+            <a:r>
+              <a:rPr lang="en-IN" dirty="0" smtClean="0"/>
+              <a:t>Swagger Screenshot</a:t>
+            </a:r>
+            <a:endParaRPr lang="en-US" dirty="0"/>
+          </a:p>
+        </p:txBody>
+      </p:sp>
+      <p:pic>
+        <p:nvPicPr>
+          <p:cNvPr id="4098" name="Picture 2"/>
+          <p:cNvPicPr>
+            <a:picLocks noGrp="1" noChangeAspect="1" noChangeArrowheads="1"/>
+          </p:cNvPicPr>
+          <p:nvPr>
+            <p:ph idx="1"/>
+          </p:nvPr>
+        </p:nvPicPr>
+        <p:blipFill>
+          <a:blip r:embed="rId2"/>
+          <a:srcRect/>
+          <a:stretch>
+            <a:fillRect/>
+          </a:stretch>
+        </p:blipFill>
+        <p:spPr bwMode="auto">
+          <a:xfrm>
+            <a:off x="458014" y="1774825"/>
+            <a:ext cx="8227971" cy="4625975"/>
+          </a:xfrm>
+          <a:prstGeom prst="rect">
+            <a:avLst/>
+          </a:prstGeom>
+          <a:noFill/>
+          <a:ln w="9525">
+            <a:noFill/>
+            <a:miter lim="800000"/>
+            <a:headEnd/>
+            <a:tailEnd/>
+          </a:ln>
+          <a:effectLst/>
+        </p:spPr>
+      </p:pic>
+    </p:spTree>
+  </p:cSld>
+  <p:clrMapOvr>
+    <a:masterClrMapping/>
+  </p:clrMapOvr>
+</p:sld>
+</file>
+
+<file path=ppt/slides/slide19.xml><?xml version="1.0" encoding="utf-8"?>
+<p:sld xmlns:a="http://schemas.openxmlformats.org/drawingml/2006/main" xmlns:r="http://schemas.openxmlformats.org/officeDocument/2006/relationships" xmlns:p="http://schemas.openxmlformats.org/presentationml/2006/main">
+  <p:cSld>
+    <p:spTree>
+      <p:nvGrpSpPr>
+        <p:cNvPr id="1" name=""/>
+        <p:cNvGrpSpPr/>
+        <p:nvPr/>
+      </p:nvGrpSpPr>
+      <p:grpSpPr>
+        <a:xfrm>
+          <a:off x="0" y="0"/>
+          <a:ext cx="0" cy="0"/>
+          <a:chOff x="0" y="0"/>
+          <a:chExt cx="0" cy="0"/>
+        </a:xfrm>
+      </p:grpSpPr>
+      <p:sp>
+        <p:nvSpPr>
+          <p:cNvPr id="2" name="Title 1"/>
+          <p:cNvSpPr>
+            <a:spLocks noGrp="1"/>
+          </p:cNvSpPr>
+          <p:nvPr>
+            <p:ph type="title"/>
+          </p:nvPr>
+        </p:nvSpPr>
+        <p:spPr/>
+        <p:txBody>
+          <a:bodyPr/>
+          <a:lstStyle/>
+          <a:p>
+            <a:r>
+              <a:rPr lang="en-IN" dirty="0" smtClean="0"/>
               <a:t>Dockerization</a:t>
             </a:r>
             <a:endParaRPr lang="en-US" dirty="0"/>
@@ -8868,7 +9038,1218 @@
 </p:sld>
 </file>
 
-<file path=ppt/slides/slide18.xml><?xml version="1.0" encoding="utf-8"?>
+<file path=ppt/slides/slide2.xml><?xml version="1.0" encoding="utf-8"?>
+<p:sld xmlns:a="http://schemas.openxmlformats.org/drawingml/2006/main" xmlns:r="http://schemas.openxmlformats.org/officeDocument/2006/relationships" xmlns:p="http://schemas.openxmlformats.org/presentationml/2006/main">
+  <p:cSld>
+    <p:spTree>
+      <p:nvGrpSpPr>
+        <p:cNvPr id="1" name=""/>
+        <p:cNvGrpSpPr/>
+        <p:nvPr/>
+      </p:nvGrpSpPr>
+      <p:grpSpPr>
+        <a:xfrm>
+          <a:off x="0" y="0"/>
+          <a:ext cx="0" cy="0"/>
+          <a:chOff x="0" y="0"/>
+          <a:chExt cx="0" cy="0"/>
+        </a:xfrm>
+      </p:grpSpPr>
+      <p:sp>
+        <p:nvSpPr>
+          <p:cNvPr id="2" name="Title 1"/>
+          <p:cNvSpPr>
+            <a:spLocks noGrp="1"/>
+          </p:cNvSpPr>
+          <p:nvPr>
+            <p:ph type="title"/>
+          </p:nvPr>
+        </p:nvSpPr>
+        <p:spPr/>
+        <p:txBody>
+          <a:bodyPr>
+            <a:normAutofit/>
+          </a:bodyPr>
+          <a:lstStyle/>
+          <a:p>
+            <a:r>
+              <a:rPr lang="en-IN" dirty="0" smtClean="0"/>
+              <a:t>Hospital-management-system</a:t>
+            </a:r>
+            <a:endParaRPr lang="en-US" dirty="0"/>
+          </a:p>
+        </p:txBody>
+      </p:sp>
+      <p:sp>
+        <p:nvSpPr>
+          <p:cNvPr id="3" name="Content Placeholder 2"/>
+          <p:cNvSpPr>
+            <a:spLocks noGrp="1"/>
+          </p:cNvSpPr>
+          <p:nvPr>
+            <p:ph idx="1"/>
+          </p:nvPr>
+        </p:nvSpPr>
+        <p:spPr/>
+        <p:txBody>
+          <a:bodyPr>
+            <a:normAutofit/>
+          </a:bodyPr>
+          <a:lstStyle/>
+          <a:p>
+            <a:pPr>
+              <a:buNone/>
+            </a:pPr>
+            <a:r>
+              <a:rPr lang="en-IN" sz="2400" dirty="0" smtClean="0">
+                <a:latin typeface="Calibri" pitchFamily="34" charset="0"/>
+                <a:cs typeface="Calibri" pitchFamily="34" charset="0"/>
+              </a:rPr>
+              <a:t>The Project uses:</a:t>
+            </a:r>
+          </a:p>
+          <a:p>
+            <a:pPr>
+              <a:buNone/>
+            </a:pPr>
+            <a:endParaRPr lang="en-IN" sz="2400" dirty="0" smtClean="0">
+              <a:latin typeface="Calibri" pitchFamily="34" charset="0"/>
+              <a:cs typeface="Calibri" pitchFamily="34" charset="0"/>
+            </a:endParaRPr>
+          </a:p>
+          <a:p>
+            <a:pPr marL="633222" indent="-514350">
+              <a:buFont typeface="+mj-lt"/>
+              <a:buAutoNum type="arabicPeriod"/>
+            </a:pPr>
+            <a:r>
+              <a:rPr lang="en-IN" sz="2400" dirty="0" smtClean="0">
+                <a:latin typeface="Calibri" pitchFamily="34" charset="0"/>
+                <a:cs typeface="Calibri" pitchFamily="34" charset="0"/>
+              </a:rPr>
+              <a:t>Springboot</a:t>
+            </a:r>
+          </a:p>
+          <a:p>
+            <a:pPr marL="633222" indent="-514350">
+              <a:buFont typeface="+mj-lt"/>
+              <a:buAutoNum type="arabicPeriod"/>
+            </a:pPr>
+            <a:r>
+              <a:rPr lang="en-IN" sz="2400" dirty="0" smtClean="0">
+                <a:latin typeface="Calibri" pitchFamily="34" charset="0"/>
+                <a:cs typeface="Calibri" pitchFamily="34" charset="0"/>
+              </a:rPr>
+              <a:t>Maven</a:t>
+            </a:r>
+          </a:p>
+          <a:p>
+            <a:pPr marL="633222" indent="-514350">
+              <a:buFont typeface="+mj-lt"/>
+              <a:buAutoNum type="arabicPeriod"/>
+            </a:pPr>
+            <a:r>
+              <a:rPr lang="en-IN" sz="2400" dirty="0" smtClean="0">
+                <a:latin typeface="Calibri" pitchFamily="34" charset="0"/>
+                <a:cs typeface="Calibri" pitchFamily="34" charset="0"/>
+              </a:rPr>
+              <a:t>MongoDB</a:t>
+            </a:r>
+          </a:p>
+          <a:p>
+            <a:pPr marL="633222" indent="-514350">
+              <a:buFont typeface="+mj-lt"/>
+              <a:buAutoNum type="arabicPeriod"/>
+            </a:pPr>
+            <a:r>
+              <a:rPr lang="en-IN" sz="2400" dirty="0" smtClean="0">
+                <a:latin typeface="Calibri" pitchFamily="34" charset="0"/>
+                <a:cs typeface="Calibri" pitchFamily="34" charset="0"/>
+              </a:rPr>
+              <a:t>Swagger</a:t>
+            </a:r>
+          </a:p>
+          <a:p>
+            <a:pPr marL="633222" indent="-514350">
+              <a:buFont typeface="+mj-lt"/>
+              <a:buAutoNum type="arabicPeriod"/>
+            </a:pPr>
+            <a:r>
+              <a:rPr lang="en-IN" sz="2400" dirty="0" smtClean="0">
+                <a:latin typeface="Calibri" pitchFamily="34" charset="0"/>
+                <a:cs typeface="Calibri" pitchFamily="34" charset="0"/>
+              </a:rPr>
+              <a:t>Junit</a:t>
+            </a:r>
+          </a:p>
+          <a:p>
+            <a:pPr marL="633222" indent="-514350">
+              <a:buFont typeface="+mj-lt"/>
+              <a:buAutoNum type="arabicPeriod"/>
+            </a:pPr>
+            <a:r>
+              <a:rPr lang="en-IN" sz="2400" dirty="0" smtClean="0">
+                <a:latin typeface="Calibri" pitchFamily="34" charset="0"/>
+                <a:cs typeface="Calibri" pitchFamily="34" charset="0"/>
+              </a:rPr>
+              <a:t>Docker</a:t>
+            </a:r>
+          </a:p>
+          <a:p>
+            <a:pPr marL="633222" indent="-514350">
+              <a:buFont typeface="+mj-lt"/>
+              <a:buAutoNum type="arabicPeriod"/>
+            </a:pPr>
+            <a:r>
+              <a:rPr lang="en-IN" sz="2400" dirty="0" smtClean="0">
+                <a:latin typeface="Calibri" pitchFamily="34" charset="0"/>
+                <a:cs typeface="Calibri" pitchFamily="34" charset="0"/>
+              </a:rPr>
+              <a:t>GitHub</a:t>
+            </a:r>
+          </a:p>
+          <a:p>
+            <a:pPr marL="633222" indent="-514350">
+              <a:buFont typeface="+mj-lt"/>
+              <a:buAutoNum type="arabicPeriod"/>
+            </a:pPr>
+            <a:r>
+              <a:rPr lang="en-IN" sz="2400" smtClean="0">
+                <a:latin typeface="Calibri" pitchFamily="34" charset="0"/>
+                <a:cs typeface="Calibri" pitchFamily="34" charset="0"/>
+              </a:rPr>
+              <a:t>Postman</a:t>
+            </a:r>
+            <a:endParaRPr lang="en-IN" sz="2400" dirty="0" smtClean="0">
+              <a:latin typeface="Calibri" pitchFamily="34" charset="0"/>
+              <a:cs typeface="Calibri" pitchFamily="34" charset="0"/>
+            </a:endParaRPr>
+          </a:p>
+        </p:txBody>
+      </p:sp>
+    </p:spTree>
+  </p:cSld>
+  <p:clrMapOvr>
+    <a:masterClrMapping/>
+  </p:clrMapOvr>
+  <p:timing>
+    <p:tnLst>
+      <p:par>
+        <p:cTn id="1" dur="indefinite" restart="never" nodeType="tmRoot">
+          <p:childTnLst>
+            <p:seq concurrent="1" nextAc="seek">
+              <p:cTn id="2" dur="indefinite" nodeType="mainSeq">
+                <p:childTnLst>
+                  <p:par>
+                    <p:cTn id="3" fill="hold">
+                      <p:stCondLst>
+                        <p:cond delay="indefinite"/>
+                      </p:stCondLst>
+                      <p:childTnLst>
+                        <p:par>
+                          <p:cTn id="4" fill="hold">
+                            <p:stCondLst>
+                              <p:cond delay="0"/>
+                            </p:stCondLst>
+                            <p:childTnLst>
+                              <p:par>
+                                <p:cTn id="5" presetID="22" presetClass="entr" presetSubtype="4" fill="hold" grpId="0" nodeType="clickEffect">
+                                  <p:stCondLst>
+                                    <p:cond delay="0"/>
+                                  </p:stCondLst>
+                                  <p:childTnLst>
+                                    <p:set>
+                                      <p:cBhvr>
+                                        <p:cTn id="6" dur="1" fill="hold">
+                                          <p:stCondLst>
+                                            <p:cond delay="0"/>
+                                          </p:stCondLst>
+                                        </p:cTn>
+                                        <p:tgtEl>
+                                          <p:spTgt spid="2"/>
+                                        </p:tgtEl>
+                                        <p:attrNameLst>
+                                          <p:attrName>style.visibility</p:attrName>
+                                        </p:attrNameLst>
+                                      </p:cBhvr>
+                                      <p:to>
+                                        <p:strVal val="visible"/>
+                                      </p:to>
+                                    </p:set>
+                                    <p:animEffect transition="in" filter="wipe(down)">
+                                      <p:cBhvr>
+                                        <p:cTn id="7" dur="500"/>
+                                        <p:tgtEl>
+                                          <p:spTgt spid="2"/>
+                                        </p:tgtEl>
+                                      </p:cBhvr>
+                                    </p:animEffect>
+                                  </p:childTnLst>
+                                </p:cTn>
+                              </p:par>
+                            </p:childTnLst>
+                          </p:cTn>
+                        </p:par>
+                      </p:childTnLst>
+                    </p:cTn>
+                  </p:par>
+                  <p:par>
+                    <p:cTn id="8" fill="hold">
+                      <p:stCondLst>
+                        <p:cond delay="indefinite"/>
+                      </p:stCondLst>
+                      <p:childTnLst>
+                        <p:par>
+                          <p:cTn id="9" fill="hold">
+                            <p:stCondLst>
+                              <p:cond delay="0"/>
+                            </p:stCondLst>
+                            <p:childTnLst>
+                              <p:par>
+                                <p:cTn id="10" presetID="2" presetClass="entr" presetSubtype="4" fill="hold" grpId="0" nodeType="clickEffect">
+                                  <p:stCondLst>
+                                    <p:cond delay="0"/>
+                                  </p:stCondLst>
+                                  <p:childTnLst>
+                                    <p:set>
+                                      <p:cBhvr>
+                                        <p:cTn id="11" dur="1" fill="hold">
+                                          <p:stCondLst>
+                                            <p:cond delay="0"/>
+                                          </p:stCondLst>
+                                        </p:cTn>
+                                        <p:tgtEl>
+                                          <p:spTgt spid="3">
+                                            <p:txEl>
+                                              <p:pRg st="0" end="0"/>
+                                            </p:txEl>
+                                          </p:spTgt>
+                                        </p:tgtEl>
+                                        <p:attrNameLst>
+                                          <p:attrName>style.visibility</p:attrName>
+                                        </p:attrNameLst>
+                                      </p:cBhvr>
+                                      <p:to>
+                                        <p:strVal val="visible"/>
+                                      </p:to>
+                                    </p:set>
+                                    <p:anim calcmode="lin" valueType="num">
+                                      <p:cBhvr additive="base">
+                                        <p:cTn id="12" dur="500" fill="hold"/>
+                                        <p:tgtEl>
+                                          <p:spTgt spid="3">
+                                            <p:txEl>
+                                              <p:pRg st="0" end="0"/>
+                                            </p:txEl>
+                                          </p:spTgt>
+                                        </p:tgtEl>
+                                        <p:attrNameLst>
+                                          <p:attrName>ppt_x</p:attrName>
+                                        </p:attrNameLst>
+                                      </p:cBhvr>
+                                      <p:tavLst>
+                                        <p:tav tm="0">
+                                          <p:val>
+                                            <p:strVal val="#ppt_x"/>
+                                          </p:val>
+                                        </p:tav>
+                                        <p:tav tm="100000">
+                                          <p:val>
+                                            <p:strVal val="#ppt_x"/>
+                                          </p:val>
+                                        </p:tav>
+                                      </p:tavLst>
+                                    </p:anim>
+                                    <p:anim calcmode="lin" valueType="num">
+                                      <p:cBhvr additive="base">
+                                        <p:cTn id="13" dur="500" fill="hold"/>
+                                        <p:tgtEl>
+                                          <p:spTgt spid="3">
+                                            <p:txEl>
+                                              <p:pRg st="0" end="0"/>
+                                            </p:txEl>
+                                          </p:spTgt>
+                                        </p:tgtEl>
+                                        <p:attrNameLst>
+                                          <p:attrName>ppt_y</p:attrName>
+                                        </p:attrNameLst>
+                                      </p:cBhvr>
+                                      <p:tavLst>
+                                        <p:tav tm="0">
+                                          <p:val>
+                                            <p:strVal val="1+#ppt_h/2"/>
+                                          </p:val>
+                                        </p:tav>
+                                        <p:tav tm="100000">
+                                          <p:val>
+                                            <p:strVal val="#ppt_y"/>
+                                          </p:val>
+                                        </p:tav>
+                                      </p:tavLst>
+                                    </p:anim>
+                                  </p:childTnLst>
+                                </p:cTn>
+                              </p:par>
+                            </p:childTnLst>
+                          </p:cTn>
+                        </p:par>
+                      </p:childTnLst>
+                    </p:cTn>
+                  </p:par>
+                  <p:par>
+                    <p:cTn id="14" fill="hold">
+                      <p:stCondLst>
+                        <p:cond delay="indefinite"/>
+                      </p:stCondLst>
+                      <p:childTnLst>
+                        <p:par>
+                          <p:cTn id="15" fill="hold">
+                            <p:stCondLst>
+                              <p:cond delay="0"/>
+                            </p:stCondLst>
+                            <p:childTnLst>
+                              <p:par>
+                                <p:cTn id="16" presetID="2" presetClass="entr" presetSubtype="4" fill="hold" grpId="0" nodeType="clickEffect">
+                                  <p:stCondLst>
+                                    <p:cond delay="0"/>
+                                  </p:stCondLst>
+                                  <p:childTnLst>
+                                    <p:set>
+                                      <p:cBhvr>
+                                        <p:cTn id="17" dur="1" fill="hold">
+                                          <p:stCondLst>
+                                            <p:cond delay="0"/>
+                                          </p:stCondLst>
+                                        </p:cTn>
+                                        <p:tgtEl>
+                                          <p:spTgt spid="3">
+                                            <p:txEl>
+                                              <p:pRg st="2" end="2"/>
+                                            </p:txEl>
+                                          </p:spTgt>
+                                        </p:tgtEl>
+                                        <p:attrNameLst>
+                                          <p:attrName>style.visibility</p:attrName>
+                                        </p:attrNameLst>
+                                      </p:cBhvr>
+                                      <p:to>
+                                        <p:strVal val="visible"/>
+                                      </p:to>
+                                    </p:set>
+                                    <p:anim calcmode="lin" valueType="num">
+                                      <p:cBhvr additive="base">
+                                        <p:cTn id="18" dur="500" fill="hold"/>
+                                        <p:tgtEl>
+                                          <p:spTgt spid="3">
+                                            <p:txEl>
+                                              <p:pRg st="2" end="2"/>
+                                            </p:txEl>
+                                          </p:spTgt>
+                                        </p:tgtEl>
+                                        <p:attrNameLst>
+                                          <p:attrName>ppt_x</p:attrName>
+                                        </p:attrNameLst>
+                                      </p:cBhvr>
+                                      <p:tavLst>
+                                        <p:tav tm="0">
+                                          <p:val>
+                                            <p:strVal val="#ppt_x"/>
+                                          </p:val>
+                                        </p:tav>
+                                        <p:tav tm="100000">
+                                          <p:val>
+                                            <p:strVal val="#ppt_x"/>
+                                          </p:val>
+                                        </p:tav>
+                                      </p:tavLst>
+                                    </p:anim>
+                                    <p:anim calcmode="lin" valueType="num">
+                                      <p:cBhvr additive="base">
+                                        <p:cTn id="19" dur="500" fill="hold"/>
+                                        <p:tgtEl>
+                                          <p:spTgt spid="3">
+                                            <p:txEl>
+                                              <p:pRg st="2" end="2"/>
+                                            </p:txEl>
+                                          </p:spTgt>
+                                        </p:tgtEl>
+                                        <p:attrNameLst>
+                                          <p:attrName>ppt_y</p:attrName>
+                                        </p:attrNameLst>
+                                      </p:cBhvr>
+                                      <p:tavLst>
+                                        <p:tav tm="0">
+                                          <p:val>
+                                            <p:strVal val="1+#ppt_h/2"/>
+                                          </p:val>
+                                        </p:tav>
+                                        <p:tav tm="100000">
+                                          <p:val>
+                                            <p:strVal val="#ppt_y"/>
+                                          </p:val>
+                                        </p:tav>
+                                      </p:tavLst>
+                                    </p:anim>
+                                  </p:childTnLst>
+                                </p:cTn>
+                              </p:par>
+                            </p:childTnLst>
+                          </p:cTn>
+                        </p:par>
+                      </p:childTnLst>
+                    </p:cTn>
+                  </p:par>
+                  <p:par>
+                    <p:cTn id="20" fill="hold">
+                      <p:stCondLst>
+                        <p:cond delay="indefinite"/>
+                      </p:stCondLst>
+                      <p:childTnLst>
+                        <p:par>
+                          <p:cTn id="21" fill="hold">
+                            <p:stCondLst>
+                              <p:cond delay="0"/>
+                            </p:stCondLst>
+                            <p:childTnLst>
+                              <p:par>
+                                <p:cTn id="22" presetID="2" presetClass="entr" presetSubtype="4" fill="hold" grpId="0" nodeType="clickEffect">
+                                  <p:stCondLst>
+                                    <p:cond delay="0"/>
+                                  </p:stCondLst>
+                                  <p:childTnLst>
+                                    <p:set>
+                                      <p:cBhvr>
+                                        <p:cTn id="23" dur="1" fill="hold">
+                                          <p:stCondLst>
+                                            <p:cond delay="0"/>
+                                          </p:stCondLst>
+                                        </p:cTn>
+                                        <p:tgtEl>
+                                          <p:spTgt spid="3">
+                                            <p:txEl>
+                                              <p:pRg st="3" end="3"/>
+                                            </p:txEl>
+                                          </p:spTgt>
+                                        </p:tgtEl>
+                                        <p:attrNameLst>
+                                          <p:attrName>style.visibility</p:attrName>
+                                        </p:attrNameLst>
+                                      </p:cBhvr>
+                                      <p:to>
+                                        <p:strVal val="visible"/>
+                                      </p:to>
+                                    </p:set>
+                                    <p:anim calcmode="lin" valueType="num">
+                                      <p:cBhvr additive="base">
+                                        <p:cTn id="24" dur="500" fill="hold"/>
+                                        <p:tgtEl>
+                                          <p:spTgt spid="3">
+                                            <p:txEl>
+                                              <p:pRg st="3" end="3"/>
+                                            </p:txEl>
+                                          </p:spTgt>
+                                        </p:tgtEl>
+                                        <p:attrNameLst>
+                                          <p:attrName>ppt_x</p:attrName>
+                                        </p:attrNameLst>
+                                      </p:cBhvr>
+                                      <p:tavLst>
+                                        <p:tav tm="0">
+                                          <p:val>
+                                            <p:strVal val="#ppt_x"/>
+                                          </p:val>
+                                        </p:tav>
+                                        <p:tav tm="100000">
+                                          <p:val>
+                                            <p:strVal val="#ppt_x"/>
+                                          </p:val>
+                                        </p:tav>
+                                      </p:tavLst>
+                                    </p:anim>
+                                    <p:anim calcmode="lin" valueType="num">
+                                      <p:cBhvr additive="base">
+                                        <p:cTn id="25" dur="500" fill="hold"/>
+                                        <p:tgtEl>
+                                          <p:spTgt spid="3">
+                                            <p:txEl>
+                                              <p:pRg st="3" end="3"/>
+                                            </p:txEl>
+                                          </p:spTgt>
+                                        </p:tgtEl>
+                                        <p:attrNameLst>
+                                          <p:attrName>ppt_y</p:attrName>
+                                        </p:attrNameLst>
+                                      </p:cBhvr>
+                                      <p:tavLst>
+                                        <p:tav tm="0">
+                                          <p:val>
+                                            <p:strVal val="1+#ppt_h/2"/>
+                                          </p:val>
+                                        </p:tav>
+                                        <p:tav tm="100000">
+                                          <p:val>
+                                            <p:strVal val="#ppt_y"/>
+                                          </p:val>
+                                        </p:tav>
+                                      </p:tavLst>
+                                    </p:anim>
+                                  </p:childTnLst>
+                                </p:cTn>
+                              </p:par>
+                            </p:childTnLst>
+                          </p:cTn>
+                        </p:par>
+                      </p:childTnLst>
+                    </p:cTn>
+                  </p:par>
+                  <p:par>
+                    <p:cTn id="26" fill="hold">
+                      <p:stCondLst>
+                        <p:cond delay="indefinite"/>
+                      </p:stCondLst>
+                      <p:childTnLst>
+                        <p:par>
+                          <p:cTn id="27" fill="hold">
+                            <p:stCondLst>
+                              <p:cond delay="0"/>
+                            </p:stCondLst>
+                            <p:childTnLst>
+                              <p:par>
+                                <p:cTn id="28" presetID="2" presetClass="entr" presetSubtype="4" fill="hold" grpId="0" nodeType="clickEffect">
+                                  <p:stCondLst>
+                                    <p:cond delay="0"/>
+                                  </p:stCondLst>
+                                  <p:childTnLst>
+                                    <p:set>
+                                      <p:cBhvr>
+                                        <p:cTn id="29" dur="1" fill="hold">
+                                          <p:stCondLst>
+                                            <p:cond delay="0"/>
+                                          </p:stCondLst>
+                                        </p:cTn>
+                                        <p:tgtEl>
+                                          <p:spTgt spid="3">
+                                            <p:txEl>
+                                              <p:pRg st="4" end="4"/>
+                                            </p:txEl>
+                                          </p:spTgt>
+                                        </p:tgtEl>
+                                        <p:attrNameLst>
+                                          <p:attrName>style.visibility</p:attrName>
+                                        </p:attrNameLst>
+                                      </p:cBhvr>
+                                      <p:to>
+                                        <p:strVal val="visible"/>
+                                      </p:to>
+                                    </p:set>
+                                    <p:anim calcmode="lin" valueType="num">
+                                      <p:cBhvr additive="base">
+                                        <p:cTn id="30" dur="500" fill="hold"/>
+                                        <p:tgtEl>
+                                          <p:spTgt spid="3">
+                                            <p:txEl>
+                                              <p:pRg st="4" end="4"/>
+                                            </p:txEl>
+                                          </p:spTgt>
+                                        </p:tgtEl>
+                                        <p:attrNameLst>
+                                          <p:attrName>ppt_x</p:attrName>
+                                        </p:attrNameLst>
+                                      </p:cBhvr>
+                                      <p:tavLst>
+                                        <p:tav tm="0">
+                                          <p:val>
+                                            <p:strVal val="#ppt_x"/>
+                                          </p:val>
+                                        </p:tav>
+                                        <p:tav tm="100000">
+                                          <p:val>
+                                            <p:strVal val="#ppt_x"/>
+                                          </p:val>
+                                        </p:tav>
+                                      </p:tavLst>
+                                    </p:anim>
+                                    <p:anim calcmode="lin" valueType="num">
+                                      <p:cBhvr additive="base">
+                                        <p:cTn id="31" dur="500" fill="hold"/>
+                                        <p:tgtEl>
+                                          <p:spTgt spid="3">
+                                            <p:txEl>
+                                              <p:pRg st="4" end="4"/>
+                                            </p:txEl>
+                                          </p:spTgt>
+                                        </p:tgtEl>
+                                        <p:attrNameLst>
+                                          <p:attrName>ppt_y</p:attrName>
+                                        </p:attrNameLst>
+                                      </p:cBhvr>
+                                      <p:tavLst>
+                                        <p:tav tm="0">
+                                          <p:val>
+                                            <p:strVal val="1+#ppt_h/2"/>
+                                          </p:val>
+                                        </p:tav>
+                                        <p:tav tm="100000">
+                                          <p:val>
+                                            <p:strVal val="#ppt_y"/>
+                                          </p:val>
+                                        </p:tav>
+                                      </p:tavLst>
+                                    </p:anim>
+                                  </p:childTnLst>
+                                </p:cTn>
+                              </p:par>
+                            </p:childTnLst>
+                          </p:cTn>
+                        </p:par>
+                      </p:childTnLst>
+                    </p:cTn>
+                  </p:par>
+                  <p:par>
+                    <p:cTn id="32" fill="hold">
+                      <p:stCondLst>
+                        <p:cond delay="indefinite"/>
+                      </p:stCondLst>
+                      <p:childTnLst>
+                        <p:par>
+                          <p:cTn id="33" fill="hold">
+                            <p:stCondLst>
+                              <p:cond delay="0"/>
+                            </p:stCondLst>
+                            <p:childTnLst>
+                              <p:par>
+                                <p:cTn id="34" presetID="2" presetClass="entr" presetSubtype="4" fill="hold" grpId="0" nodeType="clickEffect">
+                                  <p:stCondLst>
+                                    <p:cond delay="0"/>
+                                  </p:stCondLst>
+                                  <p:childTnLst>
+                                    <p:set>
+                                      <p:cBhvr>
+                                        <p:cTn id="35" dur="1" fill="hold">
+                                          <p:stCondLst>
+                                            <p:cond delay="0"/>
+                                          </p:stCondLst>
+                                        </p:cTn>
+                                        <p:tgtEl>
+                                          <p:spTgt spid="3">
+                                            <p:txEl>
+                                              <p:pRg st="5" end="5"/>
+                                            </p:txEl>
+                                          </p:spTgt>
+                                        </p:tgtEl>
+                                        <p:attrNameLst>
+                                          <p:attrName>style.visibility</p:attrName>
+                                        </p:attrNameLst>
+                                      </p:cBhvr>
+                                      <p:to>
+                                        <p:strVal val="visible"/>
+                                      </p:to>
+                                    </p:set>
+                                    <p:anim calcmode="lin" valueType="num">
+                                      <p:cBhvr additive="base">
+                                        <p:cTn id="36" dur="500" fill="hold"/>
+                                        <p:tgtEl>
+                                          <p:spTgt spid="3">
+                                            <p:txEl>
+                                              <p:pRg st="5" end="5"/>
+                                            </p:txEl>
+                                          </p:spTgt>
+                                        </p:tgtEl>
+                                        <p:attrNameLst>
+                                          <p:attrName>ppt_x</p:attrName>
+                                        </p:attrNameLst>
+                                      </p:cBhvr>
+                                      <p:tavLst>
+                                        <p:tav tm="0">
+                                          <p:val>
+                                            <p:strVal val="#ppt_x"/>
+                                          </p:val>
+                                        </p:tav>
+                                        <p:tav tm="100000">
+                                          <p:val>
+                                            <p:strVal val="#ppt_x"/>
+                                          </p:val>
+                                        </p:tav>
+                                      </p:tavLst>
+                                    </p:anim>
+                                    <p:anim calcmode="lin" valueType="num">
+                                      <p:cBhvr additive="base">
+                                        <p:cTn id="37" dur="500" fill="hold"/>
+                                        <p:tgtEl>
+                                          <p:spTgt spid="3">
+                                            <p:txEl>
+                                              <p:pRg st="5" end="5"/>
+                                            </p:txEl>
+                                          </p:spTgt>
+                                        </p:tgtEl>
+                                        <p:attrNameLst>
+                                          <p:attrName>ppt_y</p:attrName>
+                                        </p:attrNameLst>
+                                      </p:cBhvr>
+                                      <p:tavLst>
+                                        <p:tav tm="0">
+                                          <p:val>
+                                            <p:strVal val="1+#ppt_h/2"/>
+                                          </p:val>
+                                        </p:tav>
+                                        <p:tav tm="100000">
+                                          <p:val>
+                                            <p:strVal val="#ppt_y"/>
+                                          </p:val>
+                                        </p:tav>
+                                      </p:tavLst>
+                                    </p:anim>
+                                  </p:childTnLst>
+                                </p:cTn>
+                              </p:par>
+                            </p:childTnLst>
+                          </p:cTn>
+                        </p:par>
+                      </p:childTnLst>
+                    </p:cTn>
+                  </p:par>
+                  <p:par>
+                    <p:cTn id="38" fill="hold">
+                      <p:stCondLst>
+                        <p:cond delay="indefinite"/>
+                      </p:stCondLst>
+                      <p:childTnLst>
+                        <p:par>
+                          <p:cTn id="39" fill="hold">
+                            <p:stCondLst>
+                              <p:cond delay="0"/>
+                            </p:stCondLst>
+                            <p:childTnLst>
+                              <p:par>
+                                <p:cTn id="40" presetID="2" presetClass="entr" presetSubtype="4" fill="hold" grpId="0" nodeType="clickEffect">
+                                  <p:stCondLst>
+                                    <p:cond delay="0"/>
+                                  </p:stCondLst>
+                                  <p:childTnLst>
+                                    <p:set>
+                                      <p:cBhvr>
+                                        <p:cTn id="41" dur="1" fill="hold">
+                                          <p:stCondLst>
+                                            <p:cond delay="0"/>
+                                          </p:stCondLst>
+                                        </p:cTn>
+                                        <p:tgtEl>
+                                          <p:spTgt spid="3">
+                                            <p:txEl>
+                                              <p:pRg st="6" end="6"/>
+                                            </p:txEl>
+                                          </p:spTgt>
+                                        </p:tgtEl>
+                                        <p:attrNameLst>
+                                          <p:attrName>style.visibility</p:attrName>
+                                        </p:attrNameLst>
+                                      </p:cBhvr>
+                                      <p:to>
+                                        <p:strVal val="visible"/>
+                                      </p:to>
+                                    </p:set>
+                                    <p:anim calcmode="lin" valueType="num">
+                                      <p:cBhvr additive="base">
+                                        <p:cTn id="42" dur="500" fill="hold"/>
+                                        <p:tgtEl>
+                                          <p:spTgt spid="3">
+                                            <p:txEl>
+                                              <p:pRg st="6" end="6"/>
+                                            </p:txEl>
+                                          </p:spTgt>
+                                        </p:tgtEl>
+                                        <p:attrNameLst>
+                                          <p:attrName>ppt_x</p:attrName>
+                                        </p:attrNameLst>
+                                      </p:cBhvr>
+                                      <p:tavLst>
+                                        <p:tav tm="0">
+                                          <p:val>
+                                            <p:strVal val="#ppt_x"/>
+                                          </p:val>
+                                        </p:tav>
+                                        <p:tav tm="100000">
+                                          <p:val>
+                                            <p:strVal val="#ppt_x"/>
+                                          </p:val>
+                                        </p:tav>
+                                      </p:tavLst>
+                                    </p:anim>
+                                    <p:anim calcmode="lin" valueType="num">
+                                      <p:cBhvr additive="base">
+                                        <p:cTn id="43" dur="500" fill="hold"/>
+                                        <p:tgtEl>
+                                          <p:spTgt spid="3">
+                                            <p:txEl>
+                                              <p:pRg st="6" end="6"/>
+                                            </p:txEl>
+                                          </p:spTgt>
+                                        </p:tgtEl>
+                                        <p:attrNameLst>
+                                          <p:attrName>ppt_y</p:attrName>
+                                        </p:attrNameLst>
+                                      </p:cBhvr>
+                                      <p:tavLst>
+                                        <p:tav tm="0">
+                                          <p:val>
+                                            <p:strVal val="1+#ppt_h/2"/>
+                                          </p:val>
+                                        </p:tav>
+                                        <p:tav tm="100000">
+                                          <p:val>
+                                            <p:strVal val="#ppt_y"/>
+                                          </p:val>
+                                        </p:tav>
+                                      </p:tavLst>
+                                    </p:anim>
+                                  </p:childTnLst>
+                                </p:cTn>
+                              </p:par>
+                            </p:childTnLst>
+                          </p:cTn>
+                        </p:par>
+                      </p:childTnLst>
+                    </p:cTn>
+                  </p:par>
+                  <p:par>
+                    <p:cTn id="44" fill="hold">
+                      <p:stCondLst>
+                        <p:cond delay="indefinite"/>
+                      </p:stCondLst>
+                      <p:childTnLst>
+                        <p:par>
+                          <p:cTn id="45" fill="hold">
+                            <p:stCondLst>
+                              <p:cond delay="0"/>
+                            </p:stCondLst>
+                            <p:childTnLst>
+                              <p:par>
+                                <p:cTn id="46" presetID="2" presetClass="entr" presetSubtype="4" fill="hold" grpId="0" nodeType="clickEffect">
+                                  <p:stCondLst>
+                                    <p:cond delay="0"/>
+                                  </p:stCondLst>
+                                  <p:childTnLst>
+                                    <p:set>
+                                      <p:cBhvr>
+                                        <p:cTn id="47" dur="1" fill="hold">
+                                          <p:stCondLst>
+                                            <p:cond delay="0"/>
+                                          </p:stCondLst>
+                                        </p:cTn>
+                                        <p:tgtEl>
+                                          <p:spTgt spid="3">
+                                            <p:txEl>
+                                              <p:pRg st="7" end="7"/>
+                                            </p:txEl>
+                                          </p:spTgt>
+                                        </p:tgtEl>
+                                        <p:attrNameLst>
+                                          <p:attrName>style.visibility</p:attrName>
+                                        </p:attrNameLst>
+                                      </p:cBhvr>
+                                      <p:to>
+                                        <p:strVal val="visible"/>
+                                      </p:to>
+                                    </p:set>
+                                    <p:anim calcmode="lin" valueType="num">
+                                      <p:cBhvr additive="base">
+                                        <p:cTn id="48" dur="500" fill="hold"/>
+                                        <p:tgtEl>
+                                          <p:spTgt spid="3">
+                                            <p:txEl>
+                                              <p:pRg st="7" end="7"/>
+                                            </p:txEl>
+                                          </p:spTgt>
+                                        </p:tgtEl>
+                                        <p:attrNameLst>
+                                          <p:attrName>ppt_x</p:attrName>
+                                        </p:attrNameLst>
+                                      </p:cBhvr>
+                                      <p:tavLst>
+                                        <p:tav tm="0">
+                                          <p:val>
+                                            <p:strVal val="#ppt_x"/>
+                                          </p:val>
+                                        </p:tav>
+                                        <p:tav tm="100000">
+                                          <p:val>
+                                            <p:strVal val="#ppt_x"/>
+                                          </p:val>
+                                        </p:tav>
+                                      </p:tavLst>
+                                    </p:anim>
+                                    <p:anim calcmode="lin" valueType="num">
+                                      <p:cBhvr additive="base">
+                                        <p:cTn id="49" dur="500" fill="hold"/>
+                                        <p:tgtEl>
+                                          <p:spTgt spid="3">
+                                            <p:txEl>
+                                              <p:pRg st="7" end="7"/>
+                                            </p:txEl>
+                                          </p:spTgt>
+                                        </p:tgtEl>
+                                        <p:attrNameLst>
+                                          <p:attrName>ppt_y</p:attrName>
+                                        </p:attrNameLst>
+                                      </p:cBhvr>
+                                      <p:tavLst>
+                                        <p:tav tm="0">
+                                          <p:val>
+                                            <p:strVal val="1+#ppt_h/2"/>
+                                          </p:val>
+                                        </p:tav>
+                                        <p:tav tm="100000">
+                                          <p:val>
+                                            <p:strVal val="#ppt_y"/>
+                                          </p:val>
+                                        </p:tav>
+                                      </p:tavLst>
+                                    </p:anim>
+                                  </p:childTnLst>
+                                </p:cTn>
+                              </p:par>
+                            </p:childTnLst>
+                          </p:cTn>
+                        </p:par>
+                      </p:childTnLst>
+                    </p:cTn>
+                  </p:par>
+                  <p:par>
+                    <p:cTn id="50" fill="hold">
+                      <p:stCondLst>
+                        <p:cond delay="indefinite"/>
+                      </p:stCondLst>
+                      <p:childTnLst>
+                        <p:par>
+                          <p:cTn id="51" fill="hold">
+                            <p:stCondLst>
+                              <p:cond delay="0"/>
+                            </p:stCondLst>
+                            <p:childTnLst>
+                              <p:par>
+                                <p:cTn id="52" presetID="2" presetClass="entr" presetSubtype="4" fill="hold" grpId="0" nodeType="clickEffect">
+                                  <p:stCondLst>
+                                    <p:cond delay="0"/>
+                                  </p:stCondLst>
+                                  <p:childTnLst>
+                                    <p:set>
+                                      <p:cBhvr>
+                                        <p:cTn id="53" dur="1" fill="hold">
+                                          <p:stCondLst>
+                                            <p:cond delay="0"/>
+                                          </p:stCondLst>
+                                        </p:cTn>
+                                        <p:tgtEl>
+                                          <p:spTgt spid="3">
+                                            <p:txEl>
+                                              <p:pRg st="8" end="8"/>
+                                            </p:txEl>
+                                          </p:spTgt>
+                                        </p:tgtEl>
+                                        <p:attrNameLst>
+                                          <p:attrName>style.visibility</p:attrName>
+                                        </p:attrNameLst>
+                                      </p:cBhvr>
+                                      <p:to>
+                                        <p:strVal val="visible"/>
+                                      </p:to>
+                                    </p:set>
+                                    <p:anim calcmode="lin" valueType="num">
+                                      <p:cBhvr additive="base">
+                                        <p:cTn id="54" dur="500" fill="hold"/>
+                                        <p:tgtEl>
+                                          <p:spTgt spid="3">
+                                            <p:txEl>
+                                              <p:pRg st="8" end="8"/>
+                                            </p:txEl>
+                                          </p:spTgt>
+                                        </p:tgtEl>
+                                        <p:attrNameLst>
+                                          <p:attrName>ppt_x</p:attrName>
+                                        </p:attrNameLst>
+                                      </p:cBhvr>
+                                      <p:tavLst>
+                                        <p:tav tm="0">
+                                          <p:val>
+                                            <p:strVal val="#ppt_x"/>
+                                          </p:val>
+                                        </p:tav>
+                                        <p:tav tm="100000">
+                                          <p:val>
+                                            <p:strVal val="#ppt_x"/>
+                                          </p:val>
+                                        </p:tav>
+                                      </p:tavLst>
+                                    </p:anim>
+                                    <p:anim calcmode="lin" valueType="num">
+                                      <p:cBhvr additive="base">
+                                        <p:cTn id="55" dur="500" fill="hold"/>
+                                        <p:tgtEl>
+                                          <p:spTgt spid="3">
+                                            <p:txEl>
+                                              <p:pRg st="8" end="8"/>
+                                            </p:txEl>
+                                          </p:spTgt>
+                                        </p:tgtEl>
+                                        <p:attrNameLst>
+                                          <p:attrName>ppt_y</p:attrName>
+                                        </p:attrNameLst>
+                                      </p:cBhvr>
+                                      <p:tavLst>
+                                        <p:tav tm="0">
+                                          <p:val>
+                                            <p:strVal val="1+#ppt_h/2"/>
+                                          </p:val>
+                                        </p:tav>
+                                        <p:tav tm="100000">
+                                          <p:val>
+                                            <p:strVal val="#ppt_y"/>
+                                          </p:val>
+                                        </p:tav>
+                                      </p:tavLst>
+                                    </p:anim>
+                                  </p:childTnLst>
+                                </p:cTn>
+                              </p:par>
+                            </p:childTnLst>
+                          </p:cTn>
+                        </p:par>
+                      </p:childTnLst>
+                    </p:cTn>
+                  </p:par>
+                  <p:par>
+                    <p:cTn id="56" fill="hold">
+                      <p:stCondLst>
+                        <p:cond delay="indefinite"/>
+                      </p:stCondLst>
+                      <p:childTnLst>
+                        <p:par>
+                          <p:cTn id="57" fill="hold">
+                            <p:stCondLst>
+                              <p:cond delay="0"/>
+                            </p:stCondLst>
+                            <p:childTnLst>
+                              <p:par>
+                                <p:cTn id="58" presetID="2" presetClass="entr" presetSubtype="4" fill="hold" grpId="0" nodeType="clickEffect">
+                                  <p:stCondLst>
+                                    <p:cond delay="0"/>
+                                  </p:stCondLst>
+                                  <p:childTnLst>
+                                    <p:set>
+                                      <p:cBhvr>
+                                        <p:cTn id="59" dur="1" fill="hold">
+                                          <p:stCondLst>
+                                            <p:cond delay="0"/>
+                                          </p:stCondLst>
+                                        </p:cTn>
+                                        <p:tgtEl>
+                                          <p:spTgt spid="3">
+                                            <p:txEl>
+                                              <p:pRg st="9" end="9"/>
+                                            </p:txEl>
+                                          </p:spTgt>
+                                        </p:tgtEl>
+                                        <p:attrNameLst>
+                                          <p:attrName>style.visibility</p:attrName>
+                                        </p:attrNameLst>
+                                      </p:cBhvr>
+                                      <p:to>
+                                        <p:strVal val="visible"/>
+                                      </p:to>
+                                    </p:set>
+                                    <p:anim calcmode="lin" valueType="num">
+                                      <p:cBhvr additive="base">
+                                        <p:cTn id="60" dur="500" fill="hold"/>
+                                        <p:tgtEl>
+                                          <p:spTgt spid="3">
+                                            <p:txEl>
+                                              <p:pRg st="9" end="9"/>
+                                            </p:txEl>
+                                          </p:spTgt>
+                                        </p:tgtEl>
+                                        <p:attrNameLst>
+                                          <p:attrName>ppt_x</p:attrName>
+                                        </p:attrNameLst>
+                                      </p:cBhvr>
+                                      <p:tavLst>
+                                        <p:tav tm="0">
+                                          <p:val>
+                                            <p:strVal val="#ppt_x"/>
+                                          </p:val>
+                                        </p:tav>
+                                        <p:tav tm="100000">
+                                          <p:val>
+                                            <p:strVal val="#ppt_x"/>
+                                          </p:val>
+                                        </p:tav>
+                                      </p:tavLst>
+                                    </p:anim>
+                                    <p:anim calcmode="lin" valueType="num">
+                                      <p:cBhvr additive="base">
+                                        <p:cTn id="61" dur="500" fill="hold"/>
+                                        <p:tgtEl>
+                                          <p:spTgt spid="3">
+                                            <p:txEl>
+                                              <p:pRg st="9" end="9"/>
+                                            </p:txEl>
+                                          </p:spTgt>
+                                        </p:tgtEl>
+                                        <p:attrNameLst>
+                                          <p:attrName>ppt_y</p:attrName>
+                                        </p:attrNameLst>
+                                      </p:cBhvr>
+                                      <p:tavLst>
+                                        <p:tav tm="0">
+                                          <p:val>
+                                            <p:strVal val="1+#ppt_h/2"/>
+                                          </p:val>
+                                        </p:tav>
+                                        <p:tav tm="100000">
+                                          <p:val>
+                                            <p:strVal val="#ppt_y"/>
+                                          </p:val>
+                                        </p:tav>
+                                      </p:tavLst>
+                                    </p:anim>
+                                  </p:childTnLst>
+                                </p:cTn>
+                              </p:par>
+                            </p:childTnLst>
+                          </p:cTn>
+                        </p:par>
+                      </p:childTnLst>
+                    </p:cTn>
+                  </p:par>
+                </p:childTnLst>
+              </p:cTn>
+              <p:prevCondLst>
+                <p:cond evt="onPrev" delay="0">
+                  <p:tgtEl>
+                    <p:sldTgt/>
+                  </p:tgtEl>
+                </p:cond>
+              </p:prevCondLst>
+              <p:nextCondLst>
+                <p:cond evt="onNext" delay="0">
+                  <p:tgtEl>
+                    <p:sldTgt/>
+                  </p:tgtEl>
+                </p:cond>
+              </p:nextCondLst>
+            </p:seq>
+          </p:childTnLst>
+        </p:cTn>
+      </p:par>
+    </p:tnLst>
+    <p:bldLst>
+      <p:bldP spid="2" grpId="0"/>
+      <p:bldP spid="3" grpId="0" build="p"/>
+    </p:bldLst>
+  </p:timing>
+</p:sld>
+</file>
+
+<file path=ppt/slides/slide20.xml><?xml version="1.0" encoding="utf-8"?>
 <p:sld xmlns:a="http://schemas.openxmlformats.org/drawingml/2006/main" xmlns:r="http://schemas.openxmlformats.org/officeDocument/2006/relationships" xmlns:p="http://schemas.openxmlformats.org/presentationml/2006/main">
   <p:cSld>
     <p:spTree>
@@ -8978,14 +10359,7 @@
                 <a:latin typeface="Calibri" pitchFamily="34" charset="0"/>
                 <a:cs typeface="Calibri" pitchFamily="34" charset="0"/>
               </a:rPr>
-              <a:t>as </a:t>
-            </a:r>
-            <a:r>
-              <a:rPr lang="en-IN" sz="2400" smtClean="0">
-                <a:latin typeface="Calibri" pitchFamily="34" charset="0"/>
-                <a:cs typeface="Calibri" pitchFamily="34" charset="0"/>
-              </a:rPr>
-              <a:t>Cygwin </a:t>
+              <a:t>as Cygwin </a:t>
             </a:r>
             <a:r>
               <a:rPr lang="en-IN" sz="2400" dirty="0" smtClean="0">
@@ -9304,7 +10678,173 @@
 </p:sld>
 </file>
 
-<file path=ppt/slides/slide19.xml><?xml version="1.0" encoding="utf-8"?>
+<file path=ppt/slides/slide21.xml><?xml version="1.0" encoding="utf-8"?>
+<p:sld xmlns:a="http://schemas.openxmlformats.org/drawingml/2006/main" xmlns:r="http://schemas.openxmlformats.org/officeDocument/2006/relationships" xmlns:p="http://schemas.openxmlformats.org/presentationml/2006/main">
+  <p:cSld>
+    <p:spTree>
+      <p:nvGrpSpPr>
+        <p:cNvPr id="1" name=""/>
+        <p:cNvGrpSpPr/>
+        <p:nvPr/>
+      </p:nvGrpSpPr>
+      <p:grpSpPr>
+        <a:xfrm>
+          <a:off x="0" y="0"/>
+          <a:ext cx="0" cy="0"/>
+          <a:chOff x="0" y="0"/>
+          <a:chExt cx="0" cy="0"/>
+        </a:xfrm>
+      </p:grpSpPr>
+      <p:sp>
+        <p:nvSpPr>
+          <p:cNvPr id="2" name="Title 1"/>
+          <p:cNvSpPr>
+            <a:spLocks noGrp="1"/>
+          </p:cNvSpPr>
+          <p:nvPr>
+            <p:ph type="title"/>
+          </p:nvPr>
+        </p:nvSpPr>
+        <p:spPr/>
+        <p:txBody>
+          <a:bodyPr/>
+          <a:lstStyle/>
+          <a:p>
+            <a:r>
+              <a:rPr lang="en-IN" dirty="0" smtClean="0"/>
+              <a:t>Postman Screenshot - POST</a:t>
+            </a:r>
+            <a:endParaRPr lang="en-US" dirty="0"/>
+          </a:p>
+        </p:txBody>
+      </p:sp>
+      <p:pic>
+        <p:nvPicPr>
+          <p:cNvPr id="2050" name="Picture 2"/>
+          <p:cNvPicPr>
+            <a:picLocks noGrp="1" noChangeAspect="1" noChangeArrowheads="1"/>
+          </p:cNvPicPr>
+          <p:nvPr>
+            <p:ph idx="1"/>
+          </p:nvPr>
+        </p:nvPicPr>
+        <p:blipFill>
+          <a:blip r:embed="rId2"/>
+          <a:srcRect/>
+          <a:stretch>
+            <a:fillRect/>
+          </a:stretch>
+        </p:blipFill>
+        <p:spPr bwMode="auto">
+          <a:xfrm>
+            <a:off x="458014" y="1774825"/>
+            <a:ext cx="8227971" cy="4625975"/>
+          </a:xfrm>
+          <a:prstGeom prst="rect">
+            <a:avLst/>
+          </a:prstGeom>
+          <a:noFill/>
+          <a:ln w="9525">
+            <a:noFill/>
+            <a:miter lim="800000"/>
+            <a:headEnd/>
+            <a:tailEnd/>
+          </a:ln>
+          <a:effectLst/>
+        </p:spPr>
+      </p:pic>
+    </p:spTree>
+  </p:cSld>
+  <p:clrMapOvr>
+    <a:masterClrMapping/>
+  </p:clrMapOvr>
+</p:sld>
+</file>
+
+<file path=ppt/slides/slide22.xml><?xml version="1.0" encoding="utf-8"?>
+<p:sld xmlns:a="http://schemas.openxmlformats.org/drawingml/2006/main" xmlns:r="http://schemas.openxmlformats.org/officeDocument/2006/relationships" xmlns:p="http://schemas.openxmlformats.org/presentationml/2006/main">
+  <p:cSld>
+    <p:spTree>
+      <p:nvGrpSpPr>
+        <p:cNvPr id="1" name=""/>
+        <p:cNvGrpSpPr/>
+        <p:nvPr/>
+      </p:nvGrpSpPr>
+      <p:grpSpPr>
+        <a:xfrm>
+          <a:off x="0" y="0"/>
+          <a:ext cx="0" cy="0"/>
+          <a:chOff x="0" y="0"/>
+          <a:chExt cx="0" cy="0"/>
+        </a:xfrm>
+      </p:grpSpPr>
+      <p:sp>
+        <p:nvSpPr>
+          <p:cNvPr id="2" name="Title 1"/>
+          <p:cNvSpPr>
+            <a:spLocks noGrp="1"/>
+          </p:cNvSpPr>
+          <p:nvPr>
+            <p:ph type="title"/>
+          </p:nvPr>
+        </p:nvSpPr>
+        <p:spPr/>
+        <p:txBody>
+          <a:bodyPr/>
+          <a:lstStyle/>
+          <a:p>
+            <a:r>
+              <a:rPr lang="en-IN" dirty="0" smtClean="0"/>
+              <a:t>Postman Screenshot - GET</a:t>
+            </a:r>
+            <a:endParaRPr lang="en-US" dirty="0"/>
+          </a:p>
+        </p:txBody>
+      </p:sp>
+      <p:pic>
+        <p:nvPicPr>
+          <p:cNvPr id="3074" name="Picture 2"/>
+          <p:cNvPicPr>
+            <a:picLocks noGrp="1" noChangeAspect="1" noChangeArrowheads="1"/>
+          </p:cNvPicPr>
+          <p:nvPr>
+            <p:ph idx="1"/>
+          </p:nvPr>
+        </p:nvPicPr>
+        <p:blipFill>
+          <a:blip r:embed="rId2"/>
+          <a:srcRect/>
+          <a:stretch>
+            <a:fillRect/>
+          </a:stretch>
+        </p:blipFill>
+        <p:spPr bwMode="auto">
+          <a:xfrm>
+            <a:off x="458014" y="1774825"/>
+            <a:ext cx="8227971" cy="4625975"/>
+          </a:xfrm>
+          <a:prstGeom prst="rect">
+            <a:avLst/>
+          </a:prstGeom>
+          <a:noFill/>
+          <a:ln w="9525">
+            <a:noFill/>
+            <a:miter lim="800000"/>
+            <a:headEnd/>
+            <a:tailEnd/>
+          </a:ln>
+          <a:effectLst/>
+        </p:spPr>
+      </p:pic>
+    </p:spTree>
+  </p:cSld>
+  <p:clrMapOvr>
+    <a:masterClrMapping/>
+  </p:clrMapOvr>
+</p:sld>
+</file>
+
+<file path=ppt/slides/slide23.xml><?xml version="1.0" encoding="utf-8"?>
 <p:sld xmlns:a="http://schemas.openxmlformats.org/drawingml/2006/main" xmlns:r="http://schemas.openxmlformats.org/officeDocument/2006/relationships" xmlns:p="http://schemas.openxmlformats.org/presentationml/2006/main">
   <p:cSld>
     <p:spTree>
@@ -9434,1217 +10974,6 @@
     </p:tnLst>
     <p:bldLst>
       <p:bldP spid="5" grpId="0"/>
-    </p:bldLst>
-  </p:timing>
-</p:sld>
-</file>
-
-<file path=ppt/slides/slide2.xml><?xml version="1.0" encoding="utf-8"?>
-<p:sld xmlns:a="http://schemas.openxmlformats.org/drawingml/2006/main" xmlns:r="http://schemas.openxmlformats.org/officeDocument/2006/relationships" xmlns:p="http://schemas.openxmlformats.org/presentationml/2006/main">
-  <p:cSld>
-    <p:spTree>
-      <p:nvGrpSpPr>
-        <p:cNvPr id="1" name=""/>
-        <p:cNvGrpSpPr/>
-        <p:nvPr/>
-      </p:nvGrpSpPr>
-      <p:grpSpPr>
-        <a:xfrm>
-          <a:off x="0" y="0"/>
-          <a:ext cx="0" cy="0"/>
-          <a:chOff x="0" y="0"/>
-          <a:chExt cx="0" cy="0"/>
-        </a:xfrm>
-      </p:grpSpPr>
-      <p:sp>
-        <p:nvSpPr>
-          <p:cNvPr id="2" name="Title 1"/>
-          <p:cNvSpPr>
-            <a:spLocks noGrp="1"/>
-          </p:cNvSpPr>
-          <p:nvPr>
-            <p:ph type="title"/>
-          </p:nvPr>
-        </p:nvSpPr>
-        <p:spPr/>
-        <p:txBody>
-          <a:bodyPr>
-            <a:normAutofit/>
-          </a:bodyPr>
-          <a:lstStyle/>
-          <a:p>
-            <a:r>
-              <a:rPr lang="en-IN" dirty="0" smtClean="0"/>
-              <a:t>Hospital-management-system</a:t>
-            </a:r>
-            <a:endParaRPr lang="en-US" dirty="0"/>
-          </a:p>
-        </p:txBody>
-      </p:sp>
-      <p:sp>
-        <p:nvSpPr>
-          <p:cNvPr id="3" name="Content Placeholder 2"/>
-          <p:cNvSpPr>
-            <a:spLocks noGrp="1"/>
-          </p:cNvSpPr>
-          <p:nvPr>
-            <p:ph idx="1"/>
-          </p:nvPr>
-        </p:nvSpPr>
-        <p:spPr/>
-        <p:txBody>
-          <a:bodyPr>
-            <a:normAutofit/>
-          </a:bodyPr>
-          <a:lstStyle/>
-          <a:p>
-            <a:pPr>
-              <a:buNone/>
-            </a:pPr>
-            <a:r>
-              <a:rPr lang="en-IN" sz="2400" dirty="0" smtClean="0">
-                <a:latin typeface="Calibri" pitchFamily="34" charset="0"/>
-                <a:cs typeface="Calibri" pitchFamily="34" charset="0"/>
-              </a:rPr>
-              <a:t>The Project uses:</a:t>
-            </a:r>
-          </a:p>
-          <a:p>
-            <a:pPr>
-              <a:buNone/>
-            </a:pPr>
-            <a:endParaRPr lang="en-IN" sz="2400" dirty="0" smtClean="0">
-              <a:latin typeface="Calibri" pitchFamily="34" charset="0"/>
-              <a:cs typeface="Calibri" pitchFamily="34" charset="0"/>
-            </a:endParaRPr>
-          </a:p>
-          <a:p>
-            <a:pPr marL="633222" indent="-514350">
-              <a:buFont typeface="+mj-lt"/>
-              <a:buAutoNum type="arabicPeriod"/>
-            </a:pPr>
-            <a:r>
-              <a:rPr lang="en-IN" sz="2400" dirty="0" smtClean="0">
-                <a:latin typeface="Calibri" pitchFamily="34" charset="0"/>
-                <a:cs typeface="Calibri" pitchFamily="34" charset="0"/>
-              </a:rPr>
-              <a:t>Springboot</a:t>
-            </a:r>
-          </a:p>
-          <a:p>
-            <a:pPr marL="633222" indent="-514350">
-              <a:buFont typeface="+mj-lt"/>
-              <a:buAutoNum type="arabicPeriod"/>
-            </a:pPr>
-            <a:r>
-              <a:rPr lang="en-IN" sz="2400" dirty="0" smtClean="0">
-                <a:latin typeface="Calibri" pitchFamily="34" charset="0"/>
-                <a:cs typeface="Calibri" pitchFamily="34" charset="0"/>
-              </a:rPr>
-              <a:t>Maven</a:t>
-            </a:r>
-          </a:p>
-          <a:p>
-            <a:pPr marL="633222" indent="-514350">
-              <a:buFont typeface="+mj-lt"/>
-              <a:buAutoNum type="arabicPeriod"/>
-            </a:pPr>
-            <a:r>
-              <a:rPr lang="en-IN" sz="2400" dirty="0" smtClean="0">
-                <a:latin typeface="Calibri" pitchFamily="34" charset="0"/>
-                <a:cs typeface="Calibri" pitchFamily="34" charset="0"/>
-              </a:rPr>
-              <a:t>MongoDB</a:t>
-            </a:r>
-          </a:p>
-          <a:p>
-            <a:pPr marL="633222" indent="-514350">
-              <a:buFont typeface="+mj-lt"/>
-              <a:buAutoNum type="arabicPeriod"/>
-            </a:pPr>
-            <a:r>
-              <a:rPr lang="en-IN" sz="2400" dirty="0" smtClean="0">
-                <a:latin typeface="Calibri" pitchFamily="34" charset="0"/>
-                <a:cs typeface="Calibri" pitchFamily="34" charset="0"/>
-              </a:rPr>
-              <a:t>Swagger</a:t>
-            </a:r>
-          </a:p>
-          <a:p>
-            <a:pPr marL="633222" indent="-514350">
-              <a:buFont typeface="+mj-lt"/>
-              <a:buAutoNum type="arabicPeriod"/>
-            </a:pPr>
-            <a:r>
-              <a:rPr lang="en-IN" sz="2400" dirty="0" smtClean="0">
-                <a:latin typeface="Calibri" pitchFamily="34" charset="0"/>
-                <a:cs typeface="Calibri" pitchFamily="34" charset="0"/>
-              </a:rPr>
-              <a:t>Junit</a:t>
-            </a:r>
-          </a:p>
-          <a:p>
-            <a:pPr marL="633222" indent="-514350">
-              <a:buFont typeface="+mj-lt"/>
-              <a:buAutoNum type="arabicPeriod"/>
-            </a:pPr>
-            <a:r>
-              <a:rPr lang="en-IN" sz="2400" dirty="0" smtClean="0">
-                <a:latin typeface="Calibri" pitchFamily="34" charset="0"/>
-                <a:cs typeface="Calibri" pitchFamily="34" charset="0"/>
-              </a:rPr>
-              <a:t>Docker</a:t>
-            </a:r>
-          </a:p>
-          <a:p>
-            <a:pPr marL="633222" indent="-514350">
-              <a:buFont typeface="+mj-lt"/>
-              <a:buAutoNum type="arabicPeriod"/>
-            </a:pPr>
-            <a:r>
-              <a:rPr lang="en-IN" sz="2400" dirty="0" smtClean="0">
-                <a:latin typeface="Calibri" pitchFamily="34" charset="0"/>
-                <a:cs typeface="Calibri" pitchFamily="34" charset="0"/>
-              </a:rPr>
-              <a:t>GitHub</a:t>
-            </a:r>
-          </a:p>
-          <a:p>
-            <a:pPr marL="633222" indent="-514350">
-              <a:buFont typeface="+mj-lt"/>
-              <a:buAutoNum type="arabicPeriod"/>
-            </a:pPr>
-            <a:r>
-              <a:rPr lang="en-IN" sz="2400" smtClean="0">
-                <a:latin typeface="Calibri" pitchFamily="34" charset="0"/>
-                <a:cs typeface="Calibri" pitchFamily="34" charset="0"/>
-              </a:rPr>
-              <a:t>Postman</a:t>
-            </a:r>
-            <a:endParaRPr lang="en-IN" sz="2400" dirty="0" smtClean="0">
-              <a:latin typeface="Calibri" pitchFamily="34" charset="0"/>
-              <a:cs typeface="Calibri" pitchFamily="34" charset="0"/>
-            </a:endParaRPr>
-          </a:p>
-        </p:txBody>
-      </p:sp>
-    </p:spTree>
-  </p:cSld>
-  <p:clrMapOvr>
-    <a:masterClrMapping/>
-  </p:clrMapOvr>
-  <p:timing>
-    <p:tnLst>
-      <p:par>
-        <p:cTn id="1" dur="indefinite" restart="never" nodeType="tmRoot">
-          <p:childTnLst>
-            <p:seq concurrent="1" nextAc="seek">
-              <p:cTn id="2" dur="indefinite" nodeType="mainSeq">
-                <p:childTnLst>
-                  <p:par>
-                    <p:cTn id="3" fill="hold">
-                      <p:stCondLst>
-                        <p:cond delay="indefinite"/>
-                      </p:stCondLst>
-                      <p:childTnLst>
-                        <p:par>
-                          <p:cTn id="4" fill="hold">
-                            <p:stCondLst>
-                              <p:cond delay="0"/>
-                            </p:stCondLst>
-                            <p:childTnLst>
-                              <p:par>
-                                <p:cTn id="5" presetID="22" presetClass="entr" presetSubtype="4" fill="hold" grpId="0" nodeType="clickEffect">
-                                  <p:stCondLst>
-                                    <p:cond delay="0"/>
-                                  </p:stCondLst>
-                                  <p:childTnLst>
-                                    <p:set>
-                                      <p:cBhvr>
-                                        <p:cTn id="6" dur="1" fill="hold">
-                                          <p:stCondLst>
-                                            <p:cond delay="0"/>
-                                          </p:stCondLst>
-                                        </p:cTn>
-                                        <p:tgtEl>
-                                          <p:spTgt spid="2"/>
-                                        </p:tgtEl>
-                                        <p:attrNameLst>
-                                          <p:attrName>style.visibility</p:attrName>
-                                        </p:attrNameLst>
-                                      </p:cBhvr>
-                                      <p:to>
-                                        <p:strVal val="visible"/>
-                                      </p:to>
-                                    </p:set>
-                                    <p:animEffect transition="in" filter="wipe(down)">
-                                      <p:cBhvr>
-                                        <p:cTn id="7" dur="500"/>
-                                        <p:tgtEl>
-                                          <p:spTgt spid="2"/>
-                                        </p:tgtEl>
-                                      </p:cBhvr>
-                                    </p:animEffect>
-                                  </p:childTnLst>
-                                </p:cTn>
-                              </p:par>
-                            </p:childTnLst>
-                          </p:cTn>
-                        </p:par>
-                      </p:childTnLst>
-                    </p:cTn>
-                  </p:par>
-                  <p:par>
-                    <p:cTn id="8" fill="hold">
-                      <p:stCondLst>
-                        <p:cond delay="indefinite"/>
-                      </p:stCondLst>
-                      <p:childTnLst>
-                        <p:par>
-                          <p:cTn id="9" fill="hold">
-                            <p:stCondLst>
-                              <p:cond delay="0"/>
-                            </p:stCondLst>
-                            <p:childTnLst>
-                              <p:par>
-                                <p:cTn id="10" presetID="2" presetClass="entr" presetSubtype="4" fill="hold" grpId="0" nodeType="clickEffect">
-                                  <p:stCondLst>
-                                    <p:cond delay="0"/>
-                                  </p:stCondLst>
-                                  <p:childTnLst>
-                                    <p:set>
-                                      <p:cBhvr>
-                                        <p:cTn id="11" dur="1" fill="hold">
-                                          <p:stCondLst>
-                                            <p:cond delay="0"/>
-                                          </p:stCondLst>
-                                        </p:cTn>
-                                        <p:tgtEl>
-                                          <p:spTgt spid="3">
-                                            <p:txEl>
-                                              <p:pRg st="0" end="0"/>
-                                            </p:txEl>
-                                          </p:spTgt>
-                                        </p:tgtEl>
-                                        <p:attrNameLst>
-                                          <p:attrName>style.visibility</p:attrName>
-                                        </p:attrNameLst>
-                                      </p:cBhvr>
-                                      <p:to>
-                                        <p:strVal val="visible"/>
-                                      </p:to>
-                                    </p:set>
-                                    <p:anim calcmode="lin" valueType="num">
-                                      <p:cBhvr additive="base">
-                                        <p:cTn id="12" dur="500" fill="hold"/>
-                                        <p:tgtEl>
-                                          <p:spTgt spid="3">
-                                            <p:txEl>
-                                              <p:pRg st="0" end="0"/>
-                                            </p:txEl>
-                                          </p:spTgt>
-                                        </p:tgtEl>
-                                        <p:attrNameLst>
-                                          <p:attrName>ppt_x</p:attrName>
-                                        </p:attrNameLst>
-                                      </p:cBhvr>
-                                      <p:tavLst>
-                                        <p:tav tm="0">
-                                          <p:val>
-                                            <p:strVal val="#ppt_x"/>
-                                          </p:val>
-                                        </p:tav>
-                                        <p:tav tm="100000">
-                                          <p:val>
-                                            <p:strVal val="#ppt_x"/>
-                                          </p:val>
-                                        </p:tav>
-                                      </p:tavLst>
-                                    </p:anim>
-                                    <p:anim calcmode="lin" valueType="num">
-                                      <p:cBhvr additive="base">
-                                        <p:cTn id="13" dur="500" fill="hold"/>
-                                        <p:tgtEl>
-                                          <p:spTgt spid="3">
-                                            <p:txEl>
-                                              <p:pRg st="0" end="0"/>
-                                            </p:txEl>
-                                          </p:spTgt>
-                                        </p:tgtEl>
-                                        <p:attrNameLst>
-                                          <p:attrName>ppt_y</p:attrName>
-                                        </p:attrNameLst>
-                                      </p:cBhvr>
-                                      <p:tavLst>
-                                        <p:tav tm="0">
-                                          <p:val>
-                                            <p:strVal val="1+#ppt_h/2"/>
-                                          </p:val>
-                                        </p:tav>
-                                        <p:tav tm="100000">
-                                          <p:val>
-                                            <p:strVal val="#ppt_y"/>
-                                          </p:val>
-                                        </p:tav>
-                                      </p:tavLst>
-                                    </p:anim>
-                                  </p:childTnLst>
-                                </p:cTn>
-                              </p:par>
-                            </p:childTnLst>
-                          </p:cTn>
-                        </p:par>
-                      </p:childTnLst>
-                    </p:cTn>
-                  </p:par>
-                  <p:par>
-                    <p:cTn id="14" fill="hold">
-                      <p:stCondLst>
-                        <p:cond delay="indefinite"/>
-                      </p:stCondLst>
-                      <p:childTnLst>
-                        <p:par>
-                          <p:cTn id="15" fill="hold">
-                            <p:stCondLst>
-                              <p:cond delay="0"/>
-                            </p:stCondLst>
-                            <p:childTnLst>
-                              <p:par>
-                                <p:cTn id="16" presetID="2" presetClass="entr" presetSubtype="4" fill="hold" grpId="0" nodeType="clickEffect">
-                                  <p:stCondLst>
-                                    <p:cond delay="0"/>
-                                  </p:stCondLst>
-                                  <p:childTnLst>
-                                    <p:set>
-                                      <p:cBhvr>
-                                        <p:cTn id="17" dur="1" fill="hold">
-                                          <p:stCondLst>
-                                            <p:cond delay="0"/>
-                                          </p:stCondLst>
-                                        </p:cTn>
-                                        <p:tgtEl>
-                                          <p:spTgt spid="3">
-                                            <p:txEl>
-                                              <p:pRg st="2" end="2"/>
-                                            </p:txEl>
-                                          </p:spTgt>
-                                        </p:tgtEl>
-                                        <p:attrNameLst>
-                                          <p:attrName>style.visibility</p:attrName>
-                                        </p:attrNameLst>
-                                      </p:cBhvr>
-                                      <p:to>
-                                        <p:strVal val="visible"/>
-                                      </p:to>
-                                    </p:set>
-                                    <p:anim calcmode="lin" valueType="num">
-                                      <p:cBhvr additive="base">
-                                        <p:cTn id="18" dur="500" fill="hold"/>
-                                        <p:tgtEl>
-                                          <p:spTgt spid="3">
-                                            <p:txEl>
-                                              <p:pRg st="2" end="2"/>
-                                            </p:txEl>
-                                          </p:spTgt>
-                                        </p:tgtEl>
-                                        <p:attrNameLst>
-                                          <p:attrName>ppt_x</p:attrName>
-                                        </p:attrNameLst>
-                                      </p:cBhvr>
-                                      <p:tavLst>
-                                        <p:tav tm="0">
-                                          <p:val>
-                                            <p:strVal val="#ppt_x"/>
-                                          </p:val>
-                                        </p:tav>
-                                        <p:tav tm="100000">
-                                          <p:val>
-                                            <p:strVal val="#ppt_x"/>
-                                          </p:val>
-                                        </p:tav>
-                                      </p:tavLst>
-                                    </p:anim>
-                                    <p:anim calcmode="lin" valueType="num">
-                                      <p:cBhvr additive="base">
-                                        <p:cTn id="19" dur="500" fill="hold"/>
-                                        <p:tgtEl>
-                                          <p:spTgt spid="3">
-                                            <p:txEl>
-                                              <p:pRg st="2" end="2"/>
-                                            </p:txEl>
-                                          </p:spTgt>
-                                        </p:tgtEl>
-                                        <p:attrNameLst>
-                                          <p:attrName>ppt_y</p:attrName>
-                                        </p:attrNameLst>
-                                      </p:cBhvr>
-                                      <p:tavLst>
-                                        <p:tav tm="0">
-                                          <p:val>
-                                            <p:strVal val="1+#ppt_h/2"/>
-                                          </p:val>
-                                        </p:tav>
-                                        <p:tav tm="100000">
-                                          <p:val>
-                                            <p:strVal val="#ppt_y"/>
-                                          </p:val>
-                                        </p:tav>
-                                      </p:tavLst>
-                                    </p:anim>
-                                  </p:childTnLst>
-                                </p:cTn>
-                              </p:par>
-                            </p:childTnLst>
-                          </p:cTn>
-                        </p:par>
-                      </p:childTnLst>
-                    </p:cTn>
-                  </p:par>
-                  <p:par>
-                    <p:cTn id="20" fill="hold">
-                      <p:stCondLst>
-                        <p:cond delay="indefinite"/>
-                      </p:stCondLst>
-                      <p:childTnLst>
-                        <p:par>
-                          <p:cTn id="21" fill="hold">
-                            <p:stCondLst>
-                              <p:cond delay="0"/>
-                            </p:stCondLst>
-                            <p:childTnLst>
-                              <p:par>
-                                <p:cTn id="22" presetID="2" presetClass="entr" presetSubtype="4" fill="hold" grpId="0" nodeType="clickEffect">
-                                  <p:stCondLst>
-                                    <p:cond delay="0"/>
-                                  </p:stCondLst>
-                                  <p:childTnLst>
-                                    <p:set>
-                                      <p:cBhvr>
-                                        <p:cTn id="23" dur="1" fill="hold">
-                                          <p:stCondLst>
-                                            <p:cond delay="0"/>
-                                          </p:stCondLst>
-                                        </p:cTn>
-                                        <p:tgtEl>
-                                          <p:spTgt spid="3">
-                                            <p:txEl>
-                                              <p:pRg st="3" end="3"/>
-                                            </p:txEl>
-                                          </p:spTgt>
-                                        </p:tgtEl>
-                                        <p:attrNameLst>
-                                          <p:attrName>style.visibility</p:attrName>
-                                        </p:attrNameLst>
-                                      </p:cBhvr>
-                                      <p:to>
-                                        <p:strVal val="visible"/>
-                                      </p:to>
-                                    </p:set>
-                                    <p:anim calcmode="lin" valueType="num">
-                                      <p:cBhvr additive="base">
-                                        <p:cTn id="24" dur="500" fill="hold"/>
-                                        <p:tgtEl>
-                                          <p:spTgt spid="3">
-                                            <p:txEl>
-                                              <p:pRg st="3" end="3"/>
-                                            </p:txEl>
-                                          </p:spTgt>
-                                        </p:tgtEl>
-                                        <p:attrNameLst>
-                                          <p:attrName>ppt_x</p:attrName>
-                                        </p:attrNameLst>
-                                      </p:cBhvr>
-                                      <p:tavLst>
-                                        <p:tav tm="0">
-                                          <p:val>
-                                            <p:strVal val="#ppt_x"/>
-                                          </p:val>
-                                        </p:tav>
-                                        <p:tav tm="100000">
-                                          <p:val>
-                                            <p:strVal val="#ppt_x"/>
-                                          </p:val>
-                                        </p:tav>
-                                      </p:tavLst>
-                                    </p:anim>
-                                    <p:anim calcmode="lin" valueType="num">
-                                      <p:cBhvr additive="base">
-                                        <p:cTn id="25" dur="500" fill="hold"/>
-                                        <p:tgtEl>
-                                          <p:spTgt spid="3">
-                                            <p:txEl>
-                                              <p:pRg st="3" end="3"/>
-                                            </p:txEl>
-                                          </p:spTgt>
-                                        </p:tgtEl>
-                                        <p:attrNameLst>
-                                          <p:attrName>ppt_y</p:attrName>
-                                        </p:attrNameLst>
-                                      </p:cBhvr>
-                                      <p:tavLst>
-                                        <p:tav tm="0">
-                                          <p:val>
-                                            <p:strVal val="1+#ppt_h/2"/>
-                                          </p:val>
-                                        </p:tav>
-                                        <p:tav tm="100000">
-                                          <p:val>
-                                            <p:strVal val="#ppt_y"/>
-                                          </p:val>
-                                        </p:tav>
-                                      </p:tavLst>
-                                    </p:anim>
-                                  </p:childTnLst>
-                                </p:cTn>
-                              </p:par>
-                            </p:childTnLst>
-                          </p:cTn>
-                        </p:par>
-                      </p:childTnLst>
-                    </p:cTn>
-                  </p:par>
-                  <p:par>
-                    <p:cTn id="26" fill="hold">
-                      <p:stCondLst>
-                        <p:cond delay="indefinite"/>
-                      </p:stCondLst>
-                      <p:childTnLst>
-                        <p:par>
-                          <p:cTn id="27" fill="hold">
-                            <p:stCondLst>
-                              <p:cond delay="0"/>
-                            </p:stCondLst>
-                            <p:childTnLst>
-                              <p:par>
-                                <p:cTn id="28" presetID="2" presetClass="entr" presetSubtype="4" fill="hold" grpId="0" nodeType="clickEffect">
-                                  <p:stCondLst>
-                                    <p:cond delay="0"/>
-                                  </p:stCondLst>
-                                  <p:childTnLst>
-                                    <p:set>
-                                      <p:cBhvr>
-                                        <p:cTn id="29" dur="1" fill="hold">
-                                          <p:stCondLst>
-                                            <p:cond delay="0"/>
-                                          </p:stCondLst>
-                                        </p:cTn>
-                                        <p:tgtEl>
-                                          <p:spTgt spid="3">
-                                            <p:txEl>
-                                              <p:pRg st="4" end="4"/>
-                                            </p:txEl>
-                                          </p:spTgt>
-                                        </p:tgtEl>
-                                        <p:attrNameLst>
-                                          <p:attrName>style.visibility</p:attrName>
-                                        </p:attrNameLst>
-                                      </p:cBhvr>
-                                      <p:to>
-                                        <p:strVal val="visible"/>
-                                      </p:to>
-                                    </p:set>
-                                    <p:anim calcmode="lin" valueType="num">
-                                      <p:cBhvr additive="base">
-                                        <p:cTn id="30" dur="500" fill="hold"/>
-                                        <p:tgtEl>
-                                          <p:spTgt spid="3">
-                                            <p:txEl>
-                                              <p:pRg st="4" end="4"/>
-                                            </p:txEl>
-                                          </p:spTgt>
-                                        </p:tgtEl>
-                                        <p:attrNameLst>
-                                          <p:attrName>ppt_x</p:attrName>
-                                        </p:attrNameLst>
-                                      </p:cBhvr>
-                                      <p:tavLst>
-                                        <p:tav tm="0">
-                                          <p:val>
-                                            <p:strVal val="#ppt_x"/>
-                                          </p:val>
-                                        </p:tav>
-                                        <p:tav tm="100000">
-                                          <p:val>
-                                            <p:strVal val="#ppt_x"/>
-                                          </p:val>
-                                        </p:tav>
-                                      </p:tavLst>
-                                    </p:anim>
-                                    <p:anim calcmode="lin" valueType="num">
-                                      <p:cBhvr additive="base">
-                                        <p:cTn id="31" dur="500" fill="hold"/>
-                                        <p:tgtEl>
-                                          <p:spTgt spid="3">
-                                            <p:txEl>
-                                              <p:pRg st="4" end="4"/>
-                                            </p:txEl>
-                                          </p:spTgt>
-                                        </p:tgtEl>
-                                        <p:attrNameLst>
-                                          <p:attrName>ppt_y</p:attrName>
-                                        </p:attrNameLst>
-                                      </p:cBhvr>
-                                      <p:tavLst>
-                                        <p:tav tm="0">
-                                          <p:val>
-                                            <p:strVal val="1+#ppt_h/2"/>
-                                          </p:val>
-                                        </p:tav>
-                                        <p:tav tm="100000">
-                                          <p:val>
-                                            <p:strVal val="#ppt_y"/>
-                                          </p:val>
-                                        </p:tav>
-                                      </p:tavLst>
-                                    </p:anim>
-                                  </p:childTnLst>
-                                </p:cTn>
-                              </p:par>
-                            </p:childTnLst>
-                          </p:cTn>
-                        </p:par>
-                      </p:childTnLst>
-                    </p:cTn>
-                  </p:par>
-                  <p:par>
-                    <p:cTn id="32" fill="hold">
-                      <p:stCondLst>
-                        <p:cond delay="indefinite"/>
-                      </p:stCondLst>
-                      <p:childTnLst>
-                        <p:par>
-                          <p:cTn id="33" fill="hold">
-                            <p:stCondLst>
-                              <p:cond delay="0"/>
-                            </p:stCondLst>
-                            <p:childTnLst>
-                              <p:par>
-                                <p:cTn id="34" presetID="2" presetClass="entr" presetSubtype="4" fill="hold" grpId="0" nodeType="clickEffect">
-                                  <p:stCondLst>
-                                    <p:cond delay="0"/>
-                                  </p:stCondLst>
-                                  <p:childTnLst>
-                                    <p:set>
-                                      <p:cBhvr>
-                                        <p:cTn id="35" dur="1" fill="hold">
-                                          <p:stCondLst>
-                                            <p:cond delay="0"/>
-                                          </p:stCondLst>
-                                        </p:cTn>
-                                        <p:tgtEl>
-                                          <p:spTgt spid="3">
-                                            <p:txEl>
-                                              <p:pRg st="5" end="5"/>
-                                            </p:txEl>
-                                          </p:spTgt>
-                                        </p:tgtEl>
-                                        <p:attrNameLst>
-                                          <p:attrName>style.visibility</p:attrName>
-                                        </p:attrNameLst>
-                                      </p:cBhvr>
-                                      <p:to>
-                                        <p:strVal val="visible"/>
-                                      </p:to>
-                                    </p:set>
-                                    <p:anim calcmode="lin" valueType="num">
-                                      <p:cBhvr additive="base">
-                                        <p:cTn id="36" dur="500" fill="hold"/>
-                                        <p:tgtEl>
-                                          <p:spTgt spid="3">
-                                            <p:txEl>
-                                              <p:pRg st="5" end="5"/>
-                                            </p:txEl>
-                                          </p:spTgt>
-                                        </p:tgtEl>
-                                        <p:attrNameLst>
-                                          <p:attrName>ppt_x</p:attrName>
-                                        </p:attrNameLst>
-                                      </p:cBhvr>
-                                      <p:tavLst>
-                                        <p:tav tm="0">
-                                          <p:val>
-                                            <p:strVal val="#ppt_x"/>
-                                          </p:val>
-                                        </p:tav>
-                                        <p:tav tm="100000">
-                                          <p:val>
-                                            <p:strVal val="#ppt_x"/>
-                                          </p:val>
-                                        </p:tav>
-                                      </p:tavLst>
-                                    </p:anim>
-                                    <p:anim calcmode="lin" valueType="num">
-                                      <p:cBhvr additive="base">
-                                        <p:cTn id="37" dur="500" fill="hold"/>
-                                        <p:tgtEl>
-                                          <p:spTgt spid="3">
-                                            <p:txEl>
-                                              <p:pRg st="5" end="5"/>
-                                            </p:txEl>
-                                          </p:spTgt>
-                                        </p:tgtEl>
-                                        <p:attrNameLst>
-                                          <p:attrName>ppt_y</p:attrName>
-                                        </p:attrNameLst>
-                                      </p:cBhvr>
-                                      <p:tavLst>
-                                        <p:tav tm="0">
-                                          <p:val>
-                                            <p:strVal val="1+#ppt_h/2"/>
-                                          </p:val>
-                                        </p:tav>
-                                        <p:tav tm="100000">
-                                          <p:val>
-                                            <p:strVal val="#ppt_y"/>
-                                          </p:val>
-                                        </p:tav>
-                                      </p:tavLst>
-                                    </p:anim>
-                                  </p:childTnLst>
-                                </p:cTn>
-                              </p:par>
-                            </p:childTnLst>
-                          </p:cTn>
-                        </p:par>
-                      </p:childTnLst>
-                    </p:cTn>
-                  </p:par>
-                  <p:par>
-                    <p:cTn id="38" fill="hold">
-                      <p:stCondLst>
-                        <p:cond delay="indefinite"/>
-                      </p:stCondLst>
-                      <p:childTnLst>
-                        <p:par>
-                          <p:cTn id="39" fill="hold">
-                            <p:stCondLst>
-                              <p:cond delay="0"/>
-                            </p:stCondLst>
-                            <p:childTnLst>
-                              <p:par>
-                                <p:cTn id="40" presetID="2" presetClass="entr" presetSubtype="4" fill="hold" grpId="0" nodeType="clickEffect">
-                                  <p:stCondLst>
-                                    <p:cond delay="0"/>
-                                  </p:stCondLst>
-                                  <p:childTnLst>
-                                    <p:set>
-                                      <p:cBhvr>
-                                        <p:cTn id="41" dur="1" fill="hold">
-                                          <p:stCondLst>
-                                            <p:cond delay="0"/>
-                                          </p:stCondLst>
-                                        </p:cTn>
-                                        <p:tgtEl>
-                                          <p:spTgt spid="3">
-                                            <p:txEl>
-                                              <p:pRg st="6" end="6"/>
-                                            </p:txEl>
-                                          </p:spTgt>
-                                        </p:tgtEl>
-                                        <p:attrNameLst>
-                                          <p:attrName>style.visibility</p:attrName>
-                                        </p:attrNameLst>
-                                      </p:cBhvr>
-                                      <p:to>
-                                        <p:strVal val="visible"/>
-                                      </p:to>
-                                    </p:set>
-                                    <p:anim calcmode="lin" valueType="num">
-                                      <p:cBhvr additive="base">
-                                        <p:cTn id="42" dur="500" fill="hold"/>
-                                        <p:tgtEl>
-                                          <p:spTgt spid="3">
-                                            <p:txEl>
-                                              <p:pRg st="6" end="6"/>
-                                            </p:txEl>
-                                          </p:spTgt>
-                                        </p:tgtEl>
-                                        <p:attrNameLst>
-                                          <p:attrName>ppt_x</p:attrName>
-                                        </p:attrNameLst>
-                                      </p:cBhvr>
-                                      <p:tavLst>
-                                        <p:tav tm="0">
-                                          <p:val>
-                                            <p:strVal val="#ppt_x"/>
-                                          </p:val>
-                                        </p:tav>
-                                        <p:tav tm="100000">
-                                          <p:val>
-                                            <p:strVal val="#ppt_x"/>
-                                          </p:val>
-                                        </p:tav>
-                                      </p:tavLst>
-                                    </p:anim>
-                                    <p:anim calcmode="lin" valueType="num">
-                                      <p:cBhvr additive="base">
-                                        <p:cTn id="43" dur="500" fill="hold"/>
-                                        <p:tgtEl>
-                                          <p:spTgt spid="3">
-                                            <p:txEl>
-                                              <p:pRg st="6" end="6"/>
-                                            </p:txEl>
-                                          </p:spTgt>
-                                        </p:tgtEl>
-                                        <p:attrNameLst>
-                                          <p:attrName>ppt_y</p:attrName>
-                                        </p:attrNameLst>
-                                      </p:cBhvr>
-                                      <p:tavLst>
-                                        <p:tav tm="0">
-                                          <p:val>
-                                            <p:strVal val="1+#ppt_h/2"/>
-                                          </p:val>
-                                        </p:tav>
-                                        <p:tav tm="100000">
-                                          <p:val>
-                                            <p:strVal val="#ppt_y"/>
-                                          </p:val>
-                                        </p:tav>
-                                      </p:tavLst>
-                                    </p:anim>
-                                  </p:childTnLst>
-                                </p:cTn>
-                              </p:par>
-                            </p:childTnLst>
-                          </p:cTn>
-                        </p:par>
-                      </p:childTnLst>
-                    </p:cTn>
-                  </p:par>
-                  <p:par>
-                    <p:cTn id="44" fill="hold">
-                      <p:stCondLst>
-                        <p:cond delay="indefinite"/>
-                      </p:stCondLst>
-                      <p:childTnLst>
-                        <p:par>
-                          <p:cTn id="45" fill="hold">
-                            <p:stCondLst>
-                              <p:cond delay="0"/>
-                            </p:stCondLst>
-                            <p:childTnLst>
-                              <p:par>
-                                <p:cTn id="46" presetID="2" presetClass="entr" presetSubtype="4" fill="hold" grpId="0" nodeType="clickEffect">
-                                  <p:stCondLst>
-                                    <p:cond delay="0"/>
-                                  </p:stCondLst>
-                                  <p:childTnLst>
-                                    <p:set>
-                                      <p:cBhvr>
-                                        <p:cTn id="47" dur="1" fill="hold">
-                                          <p:stCondLst>
-                                            <p:cond delay="0"/>
-                                          </p:stCondLst>
-                                        </p:cTn>
-                                        <p:tgtEl>
-                                          <p:spTgt spid="3">
-                                            <p:txEl>
-                                              <p:pRg st="7" end="7"/>
-                                            </p:txEl>
-                                          </p:spTgt>
-                                        </p:tgtEl>
-                                        <p:attrNameLst>
-                                          <p:attrName>style.visibility</p:attrName>
-                                        </p:attrNameLst>
-                                      </p:cBhvr>
-                                      <p:to>
-                                        <p:strVal val="visible"/>
-                                      </p:to>
-                                    </p:set>
-                                    <p:anim calcmode="lin" valueType="num">
-                                      <p:cBhvr additive="base">
-                                        <p:cTn id="48" dur="500" fill="hold"/>
-                                        <p:tgtEl>
-                                          <p:spTgt spid="3">
-                                            <p:txEl>
-                                              <p:pRg st="7" end="7"/>
-                                            </p:txEl>
-                                          </p:spTgt>
-                                        </p:tgtEl>
-                                        <p:attrNameLst>
-                                          <p:attrName>ppt_x</p:attrName>
-                                        </p:attrNameLst>
-                                      </p:cBhvr>
-                                      <p:tavLst>
-                                        <p:tav tm="0">
-                                          <p:val>
-                                            <p:strVal val="#ppt_x"/>
-                                          </p:val>
-                                        </p:tav>
-                                        <p:tav tm="100000">
-                                          <p:val>
-                                            <p:strVal val="#ppt_x"/>
-                                          </p:val>
-                                        </p:tav>
-                                      </p:tavLst>
-                                    </p:anim>
-                                    <p:anim calcmode="lin" valueType="num">
-                                      <p:cBhvr additive="base">
-                                        <p:cTn id="49" dur="500" fill="hold"/>
-                                        <p:tgtEl>
-                                          <p:spTgt spid="3">
-                                            <p:txEl>
-                                              <p:pRg st="7" end="7"/>
-                                            </p:txEl>
-                                          </p:spTgt>
-                                        </p:tgtEl>
-                                        <p:attrNameLst>
-                                          <p:attrName>ppt_y</p:attrName>
-                                        </p:attrNameLst>
-                                      </p:cBhvr>
-                                      <p:tavLst>
-                                        <p:tav tm="0">
-                                          <p:val>
-                                            <p:strVal val="1+#ppt_h/2"/>
-                                          </p:val>
-                                        </p:tav>
-                                        <p:tav tm="100000">
-                                          <p:val>
-                                            <p:strVal val="#ppt_y"/>
-                                          </p:val>
-                                        </p:tav>
-                                      </p:tavLst>
-                                    </p:anim>
-                                  </p:childTnLst>
-                                </p:cTn>
-                              </p:par>
-                            </p:childTnLst>
-                          </p:cTn>
-                        </p:par>
-                      </p:childTnLst>
-                    </p:cTn>
-                  </p:par>
-                  <p:par>
-                    <p:cTn id="50" fill="hold">
-                      <p:stCondLst>
-                        <p:cond delay="indefinite"/>
-                      </p:stCondLst>
-                      <p:childTnLst>
-                        <p:par>
-                          <p:cTn id="51" fill="hold">
-                            <p:stCondLst>
-                              <p:cond delay="0"/>
-                            </p:stCondLst>
-                            <p:childTnLst>
-                              <p:par>
-                                <p:cTn id="52" presetID="2" presetClass="entr" presetSubtype="4" fill="hold" grpId="0" nodeType="clickEffect">
-                                  <p:stCondLst>
-                                    <p:cond delay="0"/>
-                                  </p:stCondLst>
-                                  <p:childTnLst>
-                                    <p:set>
-                                      <p:cBhvr>
-                                        <p:cTn id="53" dur="1" fill="hold">
-                                          <p:stCondLst>
-                                            <p:cond delay="0"/>
-                                          </p:stCondLst>
-                                        </p:cTn>
-                                        <p:tgtEl>
-                                          <p:spTgt spid="3">
-                                            <p:txEl>
-                                              <p:pRg st="8" end="8"/>
-                                            </p:txEl>
-                                          </p:spTgt>
-                                        </p:tgtEl>
-                                        <p:attrNameLst>
-                                          <p:attrName>style.visibility</p:attrName>
-                                        </p:attrNameLst>
-                                      </p:cBhvr>
-                                      <p:to>
-                                        <p:strVal val="visible"/>
-                                      </p:to>
-                                    </p:set>
-                                    <p:anim calcmode="lin" valueType="num">
-                                      <p:cBhvr additive="base">
-                                        <p:cTn id="54" dur="500" fill="hold"/>
-                                        <p:tgtEl>
-                                          <p:spTgt spid="3">
-                                            <p:txEl>
-                                              <p:pRg st="8" end="8"/>
-                                            </p:txEl>
-                                          </p:spTgt>
-                                        </p:tgtEl>
-                                        <p:attrNameLst>
-                                          <p:attrName>ppt_x</p:attrName>
-                                        </p:attrNameLst>
-                                      </p:cBhvr>
-                                      <p:tavLst>
-                                        <p:tav tm="0">
-                                          <p:val>
-                                            <p:strVal val="#ppt_x"/>
-                                          </p:val>
-                                        </p:tav>
-                                        <p:tav tm="100000">
-                                          <p:val>
-                                            <p:strVal val="#ppt_x"/>
-                                          </p:val>
-                                        </p:tav>
-                                      </p:tavLst>
-                                    </p:anim>
-                                    <p:anim calcmode="lin" valueType="num">
-                                      <p:cBhvr additive="base">
-                                        <p:cTn id="55" dur="500" fill="hold"/>
-                                        <p:tgtEl>
-                                          <p:spTgt spid="3">
-                                            <p:txEl>
-                                              <p:pRg st="8" end="8"/>
-                                            </p:txEl>
-                                          </p:spTgt>
-                                        </p:tgtEl>
-                                        <p:attrNameLst>
-                                          <p:attrName>ppt_y</p:attrName>
-                                        </p:attrNameLst>
-                                      </p:cBhvr>
-                                      <p:tavLst>
-                                        <p:tav tm="0">
-                                          <p:val>
-                                            <p:strVal val="1+#ppt_h/2"/>
-                                          </p:val>
-                                        </p:tav>
-                                        <p:tav tm="100000">
-                                          <p:val>
-                                            <p:strVal val="#ppt_y"/>
-                                          </p:val>
-                                        </p:tav>
-                                      </p:tavLst>
-                                    </p:anim>
-                                  </p:childTnLst>
-                                </p:cTn>
-                              </p:par>
-                            </p:childTnLst>
-                          </p:cTn>
-                        </p:par>
-                      </p:childTnLst>
-                    </p:cTn>
-                  </p:par>
-                  <p:par>
-                    <p:cTn id="56" fill="hold">
-                      <p:stCondLst>
-                        <p:cond delay="indefinite"/>
-                      </p:stCondLst>
-                      <p:childTnLst>
-                        <p:par>
-                          <p:cTn id="57" fill="hold">
-                            <p:stCondLst>
-                              <p:cond delay="0"/>
-                            </p:stCondLst>
-                            <p:childTnLst>
-                              <p:par>
-                                <p:cTn id="58" presetID="2" presetClass="entr" presetSubtype="4" fill="hold" grpId="0" nodeType="clickEffect">
-                                  <p:stCondLst>
-                                    <p:cond delay="0"/>
-                                  </p:stCondLst>
-                                  <p:childTnLst>
-                                    <p:set>
-                                      <p:cBhvr>
-                                        <p:cTn id="59" dur="1" fill="hold">
-                                          <p:stCondLst>
-                                            <p:cond delay="0"/>
-                                          </p:stCondLst>
-                                        </p:cTn>
-                                        <p:tgtEl>
-                                          <p:spTgt spid="3">
-                                            <p:txEl>
-                                              <p:pRg st="9" end="9"/>
-                                            </p:txEl>
-                                          </p:spTgt>
-                                        </p:tgtEl>
-                                        <p:attrNameLst>
-                                          <p:attrName>style.visibility</p:attrName>
-                                        </p:attrNameLst>
-                                      </p:cBhvr>
-                                      <p:to>
-                                        <p:strVal val="visible"/>
-                                      </p:to>
-                                    </p:set>
-                                    <p:anim calcmode="lin" valueType="num">
-                                      <p:cBhvr additive="base">
-                                        <p:cTn id="60" dur="500" fill="hold"/>
-                                        <p:tgtEl>
-                                          <p:spTgt spid="3">
-                                            <p:txEl>
-                                              <p:pRg st="9" end="9"/>
-                                            </p:txEl>
-                                          </p:spTgt>
-                                        </p:tgtEl>
-                                        <p:attrNameLst>
-                                          <p:attrName>ppt_x</p:attrName>
-                                        </p:attrNameLst>
-                                      </p:cBhvr>
-                                      <p:tavLst>
-                                        <p:tav tm="0">
-                                          <p:val>
-                                            <p:strVal val="#ppt_x"/>
-                                          </p:val>
-                                        </p:tav>
-                                        <p:tav tm="100000">
-                                          <p:val>
-                                            <p:strVal val="#ppt_x"/>
-                                          </p:val>
-                                        </p:tav>
-                                      </p:tavLst>
-                                    </p:anim>
-                                    <p:anim calcmode="lin" valueType="num">
-                                      <p:cBhvr additive="base">
-                                        <p:cTn id="61" dur="500" fill="hold"/>
-                                        <p:tgtEl>
-                                          <p:spTgt spid="3">
-                                            <p:txEl>
-                                              <p:pRg st="9" end="9"/>
-                                            </p:txEl>
-                                          </p:spTgt>
-                                        </p:tgtEl>
-                                        <p:attrNameLst>
-                                          <p:attrName>ppt_y</p:attrName>
-                                        </p:attrNameLst>
-                                      </p:cBhvr>
-                                      <p:tavLst>
-                                        <p:tav tm="0">
-                                          <p:val>
-                                            <p:strVal val="1+#ppt_h/2"/>
-                                          </p:val>
-                                        </p:tav>
-                                        <p:tav tm="100000">
-                                          <p:val>
-                                            <p:strVal val="#ppt_y"/>
-                                          </p:val>
-                                        </p:tav>
-                                      </p:tavLst>
-                                    </p:anim>
-                                  </p:childTnLst>
-                                </p:cTn>
-                              </p:par>
-                            </p:childTnLst>
-                          </p:cTn>
-                        </p:par>
-                      </p:childTnLst>
-                    </p:cTn>
-                  </p:par>
-                </p:childTnLst>
-              </p:cTn>
-              <p:prevCondLst>
-                <p:cond evt="onPrev" delay="0">
-                  <p:tgtEl>
-                    <p:sldTgt/>
-                  </p:tgtEl>
-                </p:cond>
-              </p:prevCondLst>
-              <p:nextCondLst>
-                <p:cond evt="onNext" delay="0">
-                  <p:tgtEl>
-                    <p:sldTgt/>
-                  </p:tgtEl>
-                </p:cond>
-              </p:nextCondLst>
-            </p:seq>
-          </p:childTnLst>
-        </p:cTn>
-      </p:par>
-    </p:tnLst>
-    <p:bldLst>
-      <p:bldP spid="2" grpId="0"/>
-      <p:bldP spid="3" grpId="0" build="p"/>
     </p:bldLst>
   </p:timing>
 </p:sld>

</xml_diff>